<commit_message>
SRS Presentation - Feasibiltiy section
</commit_message>
<xml_diff>
--- a/SRS Presentation/SRS Presentation.pptx
+++ b/SRS Presentation/SRS Presentation.pptx
@@ -32,6 +32,10 @@
     <p:sldId id="286" r:id="rId26"/>
     <p:sldId id="263" r:id="rId27"/>
     <p:sldId id="261" r:id="rId28"/>
+    <p:sldId id="287" r:id="rId29"/>
+    <p:sldId id="288" r:id="rId30"/>
+    <p:sldId id="289" r:id="rId31"/>
+    <p:sldId id="290" r:id="rId32"/>
   </p:sldIdLst>
   <p:sldSz cx="12192000" cy="6858000"/>
   <p:notesSz cx="6858000" cy="9144000"/>
@@ -130,6 +134,22 @@
       </a:defRPr>
     </a:lvl9pPr>
   </p:defaultTextStyle>
+  <p:extLst>
+    <p:ext uri="{EFAFB233-063F-42B5-8137-9DF3F51BA10A}">
+      <p15:sldGuideLst xmlns:p15="http://schemas.microsoft.com/office/powerpoint/2012/main">
+        <p15:guide id="1" orient="horz" pos="2160">
+          <p15:clr>
+            <a:srgbClr val="A4A3A4"/>
+          </p15:clr>
+        </p15:guide>
+        <p15:guide id="2" pos="3840">
+          <p15:clr>
+            <a:srgbClr val="A4A3A4"/>
+          </p15:clr>
+        </p15:guide>
+      </p15:sldGuideLst>
+    </p:ext>
+  </p:extLst>
 </p:presentation>
 </file>
 
@@ -6614,11 +6634,7 @@
           <a:p>
             <a:r>
               <a:rPr lang="en-US" sz="4500" dirty="0" smtClean="0"/>
-              <a:t>Other Requirements: </a:t>
-            </a:r>
-            <a:r>
-              <a:rPr lang="en-US" sz="4500" dirty="0" smtClean="0"/>
-              <a:t>Additional</a:t>
+              <a:t>Other Requirements: Additional</a:t>
             </a:r>
             <a:endParaRPr lang="en-US" sz="4500" dirty="0"/>
           </a:p>
@@ -6913,11 +6929,7 @@
           <a:p>
             <a:r>
               <a:rPr lang="en-US" sz="4500" dirty="0" smtClean="0"/>
-              <a:t>Other Requirements: </a:t>
-            </a:r>
-            <a:r>
-              <a:rPr lang="en-US" sz="4500" dirty="0" smtClean="0"/>
-              <a:t>Additional</a:t>
+              <a:t>Other Requirements: Additional</a:t>
             </a:r>
             <a:endParaRPr lang="en-US" sz="4500" dirty="0"/>
           </a:p>
@@ -7115,11 +7127,7 @@
           <a:p>
             <a:r>
               <a:rPr lang="en-US" sz="4500" dirty="0" smtClean="0"/>
-              <a:t>Other Requirements: </a:t>
-            </a:r>
-            <a:r>
-              <a:rPr lang="en-US" sz="4500" dirty="0" smtClean="0"/>
-              <a:t>Acceptance Criteria</a:t>
+              <a:t>Other Requirements: Acceptance Criteria</a:t>
             </a:r>
             <a:endParaRPr lang="en-US" sz="4500" dirty="0"/>
           </a:p>
@@ -7385,11 +7393,7 @@
           <a:p>
             <a:r>
               <a:rPr lang="en-US" sz="4500" dirty="0" smtClean="0"/>
-              <a:t>Other Requirements: </a:t>
-            </a:r>
-            <a:r>
-              <a:rPr lang="en-US" sz="4500" dirty="0" smtClean="0"/>
-              <a:t>Acceptance Criteria</a:t>
+              <a:t>Other Requirements: Acceptance Criteria</a:t>
             </a:r>
             <a:endParaRPr lang="en-US" sz="4500" dirty="0"/>
           </a:p>
@@ -8018,6 +8022,295 @@
 </p:sld>
 </file>
 
+<file path=ppt/slides/slide28.xml><?xml version="1.0" encoding="utf-8"?>
+<p:sld xmlns:a="http://schemas.openxmlformats.org/drawingml/2006/main" xmlns:r="http://schemas.openxmlformats.org/officeDocument/2006/relationships" xmlns:p="http://schemas.openxmlformats.org/presentationml/2006/main">
+  <p:cSld>
+    <p:spTree>
+      <p:nvGrpSpPr>
+        <p:cNvPr id="1" name=""/>
+        <p:cNvGrpSpPr/>
+        <p:nvPr/>
+      </p:nvGrpSpPr>
+      <p:grpSpPr>
+        <a:xfrm>
+          <a:off x="0" y="0"/>
+          <a:ext cx="0" cy="0"/>
+          <a:chOff x="0" y="0"/>
+          <a:chExt cx="0" cy="0"/>
+        </a:xfrm>
+      </p:grpSpPr>
+      <p:sp>
+        <p:nvSpPr>
+          <p:cNvPr id="2" name="Title 1"/>
+          <p:cNvSpPr>
+            <a:spLocks noGrp="1"/>
+          </p:cNvSpPr>
+          <p:nvPr>
+            <p:ph type="title"/>
+          </p:nvPr>
+        </p:nvSpPr>
+        <p:spPr/>
+        <p:txBody>
+          <a:bodyPr/>
+          <a:lstStyle/>
+          <a:p>
+            <a:r>
+              <a:rPr lang="en-US" dirty="0" smtClean="0"/>
+              <a:t>Feasibility: Scope Analysis</a:t>
+            </a:r>
+            <a:endParaRPr lang="en-US" dirty="0"/>
+          </a:p>
+        </p:txBody>
+      </p:sp>
+      <p:sp>
+        <p:nvSpPr>
+          <p:cNvPr id="3" name="Content Placeholder 2"/>
+          <p:cNvSpPr>
+            <a:spLocks noGrp="1"/>
+          </p:cNvSpPr>
+          <p:nvPr>
+            <p:ph idx="1"/>
+          </p:nvPr>
+        </p:nvSpPr>
+        <p:spPr/>
+        <p:txBody>
+          <a:bodyPr>
+            <a:normAutofit/>
+          </a:bodyPr>
+          <a:lstStyle/>
+          <a:p>
+            <a:r>
+              <a:rPr lang="en-US" sz="2800" dirty="0" smtClean="0"/>
+              <a:t>Scope: Software only</a:t>
+            </a:r>
+          </a:p>
+          <a:p>
+            <a:r>
+              <a:rPr lang="en-US" sz="2800" dirty="0" smtClean="0"/>
+              <a:t>Majority of the scope:</a:t>
+            </a:r>
+          </a:p>
+          <a:p>
+            <a:pPr lvl="1"/>
+            <a:r>
+              <a:rPr lang="en-US" sz="2800" dirty="0"/>
+              <a:t>Customer Requirement 3.14 Slicing Geometry into Thickness </a:t>
+            </a:r>
+            <a:r>
+              <a:rPr lang="en-US" sz="2800" dirty="0" smtClean="0"/>
+              <a:t>Levels</a:t>
+            </a:r>
+          </a:p>
+          <a:p>
+            <a:pPr lvl="1"/>
+            <a:r>
+              <a:rPr lang="en-US" sz="2800" dirty="0" smtClean="0"/>
+              <a:t>Customer </a:t>
+            </a:r>
+            <a:r>
+              <a:rPr lang="en-US" sz="2800" dirty="0"/>
+              <a:t>Requirement 3.11 Creating Printing </a:t>
+            </a:r>
+            <a:r>
+              <a:rPr lang="en-US" sz="2800" dirty="0" smtClean="0"/>
+              <a:t>Paths</a:t>
+            </a:r>
+          </a:p>
+          <a:p>
+            <a:pPr lvl="1"/>
+            <a:r>
+              <a:rPr lang="en-US" sz="2800" dirty="0" smtClean="0"/>
+              <a:t>Customer </a:t>
+            </a:r>
+            <a:r>
+              <a:rPr lang="en-US" sz="2800" dirty="0"/>
+              <a:t>Requirement 3.3   Generating Machine </a:t>
+            </a:r>
+            <a:r>
+              <a:rPr lang="en-US" sz="2800" dirty="0" smtClean="0"/>
+              <a:t>Instructions</a:t>
+            </a:r>
+          </a:p>
+          <a:p>
+            <a:pPr lvl="1"/>
+            <a:r>
+              <a:rPr lang="en-US" sz="2800" dirty="0" smtClean="0"/>
+              <a:t>Customer </a:t>
+            </a:r>
+            <a:r>
+              <a:rPr lang="en-US" sz="2800" dirty="0"/>
+              <a:t>Requirement 3.4   Issuing Machine </a:t>
+            </a:r>
+            <a:r>
+              <a:rPr lang="en-US" sz="2800" dirty="0" smtClean="0"/>
+              <a:t>Instructions</a:t>
+            </a:r>
+          </a:p>
+          <a:p>
+            <a:pPr marL="411480" lvl="1" indent="0">
+              <a:buNone/>
+            </a:pPr>
+            <a:endParaRPr lang="en-US" dirty="0"/>
+          </a:p>
+          <a:p>
+            <a:endParaRPr lang="en-US" dirty="0"/>
+          </a:p>
+        </p:txBody>
+      </p:sp>
+    </p:spTree>
+    <p:extLst>
+      <p:ext uri="{BB962C8B-B14F-4D97-AF65-F5344CB8AC3E}">
+        <p14:creationId xmlns:p14="http://schemas.microsoft.com/office/powerpoint/2010/main" val="1563924161"/>
+      </p:ext>
+    </p:extLst>
+  </p:cSld>
+  <p:clrMapOvr>
+    <a:masterClrMapping/>
+  </p:clrMapOvr>
+</p:sld>
+</file>
+
+<file path=ppt/slides/slide29.xml><?xml version="1.0" encoding="utf-8"?>
+<p:sld xmlns:a="http://schemas.openxmlformats.org/drawingml/2006/main" xmlns:r="http://schemas.openxmlformats.org/officeDocument/2006/relationships" xmlns:p="http://schemas.openxmlformats.org/presentationml/2006/main">
+  <p:cSld>
+    <p:spTree>
+      <p:nvGrpSpPr>
+        <p:cNvPr id="1" name=""/>
+        <p:cNvGrpSpPr/>
+        <p:nvPr/>
+      </p:nvGrpSpPr>
+      <p:grpSpPr>
+        <a:xfrm>
+          <a:off x="0" y="0"/>
+          <a:ext cx="0" cy="0"/>
+          <a:chOff x="0" y="0"/>
+          <a:chExt cx="0" cy="0"/>
+        </a:xfrm>
+      </p:grpSpPr>
+      <p:sp>
+        <p:nvSpPr>
+          <p:cNvPr id="2" name="Title 1"/>
+          <p:cNvSpPr>
+            <a:spLocks noGrp="1"/>
+          </p:cNvSpPr>
+          <p:nvPr>
+            <p:ph type="title"/>
+          </p:nvPr>
+        </p:nvSpPr>
+        <p:spPr/>
+        <p:txBody>
+          <a:bodyPr/>
+          <a:lstStyle/>
+          <a:p>
+            <a:r>
+              <a:rPr lang="en-US" dirty="0" smtClean="0"/>
+              <a:t>Feasibility: Key Risks and Deficiencies</a:t>
+            </a:r>
+            <a:endParaRPr lang="en-US" dirty="0"/>
+          </a:p>
+        </p:txBody>
+      </p:sp>
+      <p:sp>
+        <p:nvSpPr>
+          <p:cNvPr id="3" name="Content Placeholder 2"/>
+          <p:cNvSpPr>
+            <a:spLocks noGrp="1"/>
+          </p:cNvSpPr>
+          <p:nvPr>
+            <p:ph idx="1"/>
+          </p:nvPr>
+        </p:nvSpPr>
+        <p:spPr/>
+        <p:txBody>
+          <a:bodyPr>
+            <a:normAutofit lnSpcReduction="10000"/>
+          </a:bodyPr>
+          <a:lstStyle/>
+          <a:p>
+            <a:r>
+              <a:rPr lang="en-US" sz="3600" dirty="0" smtClean="0"/>
+              <a:t>Slic3r </a:t>
+            </a:r>
+            <a:r>
+              <a:rPr lang="en-US" sz="3600" dirty="0"/>
+              <a:t>is unsuited for the task </a:t>
+            </a:r>
+            <a:r>
+              <a:rPr lang="en-US" sz="3600" dirty="0" smtClean="0"/>
+              <a:t>as-is</a:t>
+            </a:r>
+          </a:p>
+          <a:p>
+            <a:pPr lvl="1"/>
+            <a:r>
+              <a:rPr lang="en-US" sz="3400" dirty="0"/>
+              <a:t>Analytic Geometry skills not </a:t>
+            </a:r>
+            <a:r>
+              <a:rPr lang="en-US" sz="3400" dirty="0" smtClean="0"/>
+              <a:t>sufficient</a:t>
+            </a:r>
+          </a:p>
+          <a:p>
+            <a:pPr lvl="1"/>
+            <a:r>
+              <a:rPr lang="en-US" sz="3400" dirty="0" smtClean="0"/>
+              <a:t>Research and Experimentation</a:t>
+            </a:r>
+          </a:p>
+          <a:p>
+            <a:r>
+              <a:rPr lang="en-US" sz="3600" dirty="0"/>
+              <a:t>Hardware selection is not specified </a:t>
+            </a:r>
+            <a:r>
+              <a:rPr lang="en-US" sz="3600" dirty="0" smtClean="0"/>
+              <a:t>correctly</a:t>
+            </a:r>
+          </a:p>
+          <a:p>
+            <a:pPr lvl="1"/>
+            <a:r>
+              <a:rPr lang="en-US" sz="3400" dirty="0" smtClean="0"/>
+              <a:t>Computer engineer required to assist ME team</a:t>
+            </a:r>
+          </a:p>
+          <a:p>
+            <a:pPr lvl="1"/>
+            <a:r>
+              <a:rPr lang="en-US" sz="3400" dirty="0" smtClean="0"/>
+              <a:t>Scope Definition</a:t>
+            </a:r>
+          </a:p>
+          <a:p>
+            <a:r>
+              <a:rPr lang="en-US" sz="3600" dirty="0" smtClean="0"/>
+              <a:t>Lack of 3-D printing experience</a:t>
+            </a:r>
+          </a:p>
+          <a:p>
+            <a:pPr lvl="1"/>
+            <a:r>
+              <a:rPr lang="en-US" sz="3400" dirty="0" smtClean="0"/>
+              <a:t>Research and Demonstrations</a:t>
+            </a:r>
+            <a:endParaRPr lang="en-US" sz="3400" dirty="0"/>
+          </a:p>
+        </p:txBody>
+      </p:sp>
+    </p:spTree>
+    <p:extLst>
+      <p:ext uri="{BB962C8B-B14F-4D97-AF65-F5344CB8AC3E}">
+        <p14:creationId xmlns:p14="http://schemas.microsoft.com/office/powerpoint/2010/main" val="2641203954"/>
+      </p:ext>
+    </p:extLst>
+  </p:cSld>
+  <p:clrMapOvr>
+    <a:masterClrMapping/>
+  </p:clrMapOvr>
+</p:sld>
+</file>
+
 <file path=ppt/slides/slide3.xml><?xml version="1.0" encoding="utf-8"?>
 <p:sld xmlns:a="http://schemas.openxmlformats.org/drawingml/2006/main" xmlns:r="http://schemas.openxmlformats.org/officeDocument/2006/relationships" xmlns:p="http://schemas.openxmlformats.org/presentationml/2006/main">
   <p:cSld>
@@ -8116,6 +8409,1500 @@
     <p:extLst>
       <p:ext uri="{BB962C8B-B14F-4D97-AF65-F5344CB8AC3E}">
         <p14:creationId xmlns:p14="http://schemas.microsoft.com/office/powerpoint/2010/main" val="3853870699"/>
+      </p:ext>
+    </p:extLst>
+  </p:cSld>
+  <p:clrMapOvr>
+    <a:masterClrMapping/>
+  </p:clrMapOvr>
+</p:sld>
+</file>
+
+<file path=ppt/slides/slide30.xml><?xml version="1.0" encoding="utf-8"?>
+<p:sld xmlns:a="http://schemas.openxmlformats.org/drawingml/2006/main" xmlns:r="http://schemas.openxmlformats.org/officeDocument/2006/relationships" xmlns:p="http://schemas.openxmlformats.org/presentationml/2006/main">
+  <p:cSld>
+    <p:spTree>
+      <p:nvGrpSpPr>
+        <p:cNvPr id="1" name=""/>
+        <p:cNvGrpSpPr/>
+        <p:nvPr/>
+      </p:nvGrpSpPr>
+      <p:grpSpPr>
+        <a:xfrm>
+          <a:off x="0" y="0"/>
+          <a:ext cx="0" cy="0"/>
+          <a:chOff x="0" y="0"/>
+          <a:chExt cx="0" cy="0"/>
+        </a:xfrm>
+      </p:grpSpPr>
+      <p:sp>
+        <p:nvSpPr>
+          <p:cNvPr id="2" name="Title 1"/>
+          <p:cNvSpPr>
+            <a:spLocks noGrp="1"/>
+          </p:cNvSpPr>
+          <p:nvPr>
+            <p:ph type="title"/>
+          </p:nvPr>
+        </p:nvSpPr>
+        <p:spPr/>
+        <p:txBody>
+          <a:bodyPr/>
+          <a:lstStyle/>
+          <a:p>
+            <a:r>
+              <a:rPr lang="en-US" dirty="0" smtClean="0"/>
+              <a:t>Feasibility: Cost Analysis</a:t>
+            </a:r>
+            <a:endParaRPr lang="en-US" dirty="0"/>
+          </a:p>
+        </p:txBody>
+      </p:sp>
+      <p:graphicFrame>
+        <p:nvGraphicFramePr>
+          <p:cNvPr id="4" name="Content Placeholder 3"/>
+          <p:cNvGraphicFramePr>
+            <a:graphicFrameLocks noGrp="1"/>
+          </p:cNvGraphicFramePr>
+          <p:nvPr>
+            <p:ph idx="1"/>
+            <p:extLst>
+              <p:ext uri="{D42A27DB-BD31-4B8C-83A1-F6EECF244321}">
+                <p14:modId xmlns:p14="http://schemas.microsoft.com/office/powerpoint/2010/main" val="954283900"/>
+              </p:ext>
+            </p:extLst>
+          </p:nvPr>
+        </p:nvGraphicFramePr>
+        <p:xfrm>
+          <a:off x="740979" y="1417638"/>
+          <a:ext cx="10028622" cy="5093519"/>
+        </p:xfrm>
+        <a:graphic>
+          <a:graphicData uri="http://schemas.openxmlformats.org/drawingml/2006/table">
+            <a:tbl>
+              <a:tblPr firstRow="1" firstCol="1" bandRow="1">
+                <a:tableStyleId>{5C22544A-7EE6-4342-B048-85BDC9FD1C3A}</a:tableStyleId>
+              </a:tblPr>
+              <a:tblGrid>
+                <a:gridCol w="5406054"/>
+                <a:gridCol w="1540856"/>
+                <a:gridCol w="1540856"/>
+                <a:gridCol w="1540856"/>
+              </a:tblGrid>
+              <a:tr h="872609">
+                <a:tc>
+                  <a:txBody>
+                    <a:bodyPr/>
+                    <a:lstStyle/>
+                    <a:p>
+                      <a:endParaRPr lang="en-US" sz="1600" dirty="0">
+                        <a:effectLst/>
+                        <a:latin typeface="Times New Roman" panose="02020603050405020304" pitchFamily="18" charset="0"/>
+                      </a:endParaRPr>
+                    </a:p>
+                  </a:txBody>
+                  <a:tcPr marL="68580" marR="68580" marT="0" marB="0"/>
+                </a:tc>
+                <a:tc>
+                  <a:txBody>
+                    <a:bodyPr/>
+                    <a:lstStyle/>
+                    <a:p>
+                      <a:pPr marL="0" marR="0">
+                        <a:lnSpc>
+                          <a:spcPct val="115000"/>
+                        </a:lnSpc>
+                        <a:spcBef>
+                          <a:spcPts val="0"/>
+                        </a:spcBef>
+                        <a:spcAft>
+                          <a:spcPts val="1000"/>
+                        </a:spcAft>
+                      </a:pPr>
+                      <a:r>
+                        <a:rPr lang="en-US" sz="2400">
+                          <a:effectLst/>
+                        </a:rPr>
+                        <a:t>Quantity</a:t>
+                      </a:r>
+                      <a:endParaRPr lang="en-US" sz="2400">
+                        <a:effectLst/>
+                        <a:latin typeface="Times New Roman" panose="02020603050405020304" pitchFamily="18" charset="0"/>
+                        <a:ea typeface="Times New Roman" panose="02020603050405020304" pitchFamily="18" charset="0"/>
+                      </a:endParaRPr>
+                    </a:p>
+                  </a:txBody>
+                  <a:tcPr marL="68580" marR="68580" marT="0" marB="0"/>
+                </a:tc>
+                <a:tc>
+                  <a:txBody>
+                    <a:bodyPr/>
+                    <a:lstStyle/>
+                    <a:p>
+                      <a:pPr marL="0" marR="0">
+                        <a:lnSpc>
+                          <a:spcPct val="115000"/>
+                        </a:lnSpc>
+                        <a:spcBef>
+                          <a:spcPts val="0"/>
+                        </a:spcBef>
+                        <a:spcAft>
+                          <a:spcPts val="1000"/>
+                        </a:spcAft>
+                      </a:pPr>
+                      <a:r>
+                        <a:rPr lang="en-US" sz="2400">
+                          <a:effectLst/>
+                        </a:rPr>
+                        <a:t>Cost/Unit</a:t>
+                      </a:r>
+                      <a:endParaRPr lang="en-US" sz="2400">
+                        <a:effectLst/>
+                        <a:latin typeface="Times New Roman" panose="02020603050405020304" pitchFamily="18" charset="0"/>
+                        <a:ea typeface="Times New Roman" panose="02020603050405020304" pitchFamily="18" charset="0"/>
+                      </a:endParaRPr>
+                    </a:p>
+                  </a:txBody>
+                  <a:tcPr marL="68580" marR="68580" marT="0" marB="0"/>
+                </a:tc>
+                <a:tc>
+                  <a:txBody>
+                    <a:bodyPr/>
+                    <a:lstStyle/>
+                    <a:p>
+                      <a:pPr marL="0" marR="0">
+                        <a:lnSpc>
+                          <a:spcPct val="115000"/>
+                        </a:lnSpc>
+                        <a:spcBef>
+                          <a:spcPts val="0"/>
+                        </a:spcBef>
+                        <a:spcAft>
+                          <a:spcPts val="1000"/>
+                        </a:spcAft>
+                      </a:pPr>
+                      <a:r>
+                        <a:rPr lang="en-US" sz="2400">
+                          <a:effectLst/>
+                        </a:rPr>
+                        <a:t>Total Cost</a:t>
+                      </a:r>
+                      <a:endParaRPr lang="en-US" sz="2400">
+                        <a:effectLst/>
+                        <a:latin typeface="Times New Roman" panose="02020603050405020304" pitchFamily="18" charset="0"/>
+                        <a:ea typeface="Times New Roman" panose="02020603050405020304" pitchFamily="18" charset="0"/>
+                      </a:endParaRPr>
+                    </a:p>
+                  </a:txBody>
+                  <a:tcPr marL="68580" marR="68580" marT="0" marB="0"/>
+                </a:tc>
+              </a:tr>
+              <a:tr h="422091">
+                <a:tc>
+                  <a:txBody>
+                    <a:bodyPr/>
+                    <a:lstStyle/>
+                    <a:p>
+                      <a:pPr marL="0" marR="0">
+                        <a:lnSpc>
+                          <a:spcPct val="115000"/>
+                        </a:lnSpc>
+                        <a:spcBef>
+                          <a:spcPts val="0"/>
+                        </a:spcBef>
+                        <a:spcAft>
+                          <a:spcPts val="1000"/>
+                        </a:spcAft>
+                      </a:pPr>
+                      <a:r>
+                        <a:rPr lang="en-US" sz="2400" dirty="0" err="1">
+                          <a:effectLst/>
+                        </a:rPr>
+                        <a:t>SainSmart</a:t>
+                      </a:r>
+                      <a:r>
+                        <a:rPr lang="en-US" sz="2400" dirty="0">
+                          <a:effectLst/>
+                        </a:rPr>
+                        <a:t> Mega2560 Controller</a:t>
+                      </a:r>
+                      <a:endParaRPr lang="en-US" sz="2400" dirty="0">
+                        <a:effectLst/>
+                        <a:latin typeface="Times New Roman" panose="02020603050405020304" pitchFamily="18" charset="0"/>
+                        <a:ea typeface="Times New Roman" panose="02020603050405020304" pitchFamily="18" charset="0"/>
+                      </a:endParaRPr>
+                    </a:p>
+                  </a:txBody>
+                  <a:tcPr marL="68580" marR="68580" marT="0" marB="0"/>
+                </a:tc>
+                <a:tc>
+                  <a:txBody>
+                    <a:bodyPr/>
+                    <a:lstStyle/>
+                    <a:p>
+                      <a:pPr marL="0" marR="0">
+                        <a:lnSpc>
+                          <a:spcPct val="115000"/>
+                        </a:lnSpc>
+                        <a:spcBef>
+                          <a:spcPts val="0"/>
+                        </a:spcBef>
+                        <a:spcAft>
+                          <a:spcPts val="1000"/>
+                        </a:spcAft>
+                      </a:pPr>
+                      <a:r>
+                        <a:rPr lang="en-US" sz="2400">
+                          <a:effectLst/>
+                        </a:rPr>
+                        <a:t>1</a:t>
+                      </a:r>
+                      <a:endParaRPr lang="en-US" sz="2400">
+                        <a:effectLst/>
+                        <a:latin typeface="Times New Roman" panose="02020603050405020304" pitchFamily="18" charset="0"/>
+                        <a:ea typeface="Times New Roman" panose="02020603050405020304" pitchFamily="18" charset="0"/>
+                      </a:endParaRPr>
+                    </a:p>
+                  </a:txBody>
+                  <a:tcPr marL="68580" marR="68580" marT="0" marB="0"/>
+                </a:tc>
+                <a:tc>
+                  <a:txBody>
+                    <a:bodyPr/>
+                    <a:lstStyle/>
+                    <a:p>
+                      <a:pPr marL="0" marR="0">
+                        <a:lnSpc>
+                          <a:spcPct val="115000"/>
+                        </a:lnSpc>
+                        <a:spcBef>
+                          <a:spcPts val="0"/>
+                        </a:spcBef>
+                        <a:spcAft>
+                          <a:spcPts val="1000"/>
+                        </a:spcAft>
+                      </a:pPr>
+                      <a:r>
+                        <a:rPr lang="en-US" sz="2400">
+                          <a:effectLst/>
+                        </a:rPr>
+                        <a:t>43.17</a:t>
+                      </a:r>
+                      <a:endParaRPr lang="en-US" sz="2400">
+                        <a:effectLst/>
+                        <a:latin typeface="Times New Roman" panose="02020603050405020304" pitchFamily="18" charset="0"/>
+                        <a:ea typeface="Times New Roman" panose="02020603050405020304" pitchFamily="18" charset="0"/>
+                      </a:endParaRPr>
+                    </a:p>
+                  </a:txBody>
+                  <a:tcPr marL="68580" marR="68580" marT="0" marB="0"/>
+                </a:tc>
+                <a:tc>
+                  <a:txBody>
+                    <a:bodyPr/>
+                    <a:lstStyle/>
+                    <a:p>
+                      <a:pPr marL="0" marR="0">
+                        <a:lnSpc>
+                          <a:spcPct val="115000"/>
+                        </a:lnSpc>
+                        <a:spcBef>
+                          <a:spcPts val="0"/>
+                        </a:spcBef>
+                        <a:spcAft>
+                          <a:spcPts val="1000"/>
+                        </a:spcAft>
+                      </a:pPr>
+                      <a:r>
+                        <a:rPr lang="en-US" sz="2400">
+                          <a:effectLst/>
+                        </a:rPr>
+                        <a:t>43.17</a:t>
+                      </a:r>
+                      <a:endParaRPr lang="en-US" sz="2400">
+                        <a:effectLst/>
+                        <a:latin typeface="Times New Roman" panose="02020603050405020304" pitchFamily="18" charset="0"/>
+                        <a:ea typeface="Times New Roman" panose="02020603050405020304" pitchFamily="18" charset="0"/>
+                      </a:endParaRPr>
+                    </a:p>
+                  </a:txBody>
+                  <a:tcPr marL="68580" marR="68580" marT="0" marB="0"/>
+                </a:tc>
+              </a:tr>
+              <a:tr h="422091">
+                <a:tc>
+                  <a:txBody>
+                    <a:bodyPr/>
+                    <a:lstStyle/>
+                    <a:p>
+                      <a:pPr marL="0" marR="0">
+                        <a:lnSpc>
+                          <a:spcPct val="115000"/>
+                        </a:lnSpc>
+                        <a:spcBef>
+                          <a:spcPts val="0"/>
+                        </a:spcBef>
+                        <a:spcAft>
+                          <a:spcPts val="1000"/>
+                        </a:spcAft>
+                      </a:pPr>
+                      <a:r>
+                        <a:rPr lang="en-US" sz="2400">
+                          <a:effectLst/>
+                        </a:rPr>
+                        <a:t>SainSmart RAMPS 1.4 Shield</a:t>
+                      </a:r>
+                      <a:endParaRPr lang="en-US" sz="2400">
+                        <a:effectLst/>
+                        <a:latin typeface="Times New Roman" panose="02020603050405020304" pitchFamily="18" charset="0"/>
+                        <a:ea typeface="Times New Roman" panose="02020603050405020304" pitchFamily="18" charset="0"/>
+                      </a:endParaRPr>
+                    </a:p>
+                  </a:txBody>
+                  <a:tcPr marL="68580" marR="68580" marT="0" marB="0"/>
+                </a:tc>
+                <a:tc>
+                  <a:txBody>
+                    <a:bodyPr/>
+                    <a:lstStyle/>
+                    <a:p>
+                      <a:pPr marL="0" marR="0">
+                        <a:lnSpc>
+                          <a:spcPct val="115000"/>
+                        </a:lnSpc>
+                        <a:spcBef>
+                          <a:spcPts val="0"/>
+                        </a:spcBef>
+                        <a:spcAft>
+                          <a:spcPts val="1000"/>
+                        </a:spcAft>
+                      </a:pPr>
+                      <a:r>
+                        <a:rPr lang="en-US" sz="2400">
+                          <a:effectLst/>
+                        </a:rPr>
+                        <a:t>1</a:t>
+                      </a:r>
+                      <a:endParaRPr lang="en-US" sz="2400">
+                        <a:effectLst/>
+                        <a:latin typeface="Times New Roman" panose="02020603050405020304" pitchFamily="18" charset="0"/>
+                        <a:ea typeface="Times New Roman" panose="02020603050405020304" pitchFamily="18" charset="0"/>
+                      </a:endParaRPr>
+                    </a:p>
+                  </a:txBody>
+                  <a:tcPr marL="68580" marR="68580" marT="0" marB="0"/>
+                </a:tc>
+                <a:tc>
+                  <a:txBody>
+                    <a:bodyPr/>
+                    <a:lstStyle/>
+                    <a:p>
+                      <a:pPr marL="0" marR="0">
+                        <a:lnSpc>
+                          <a:spcPct val="115000"/>
+                        </a:lnSpc>
+                        <a:spcBef>
+                          <a:spcPts val="0"/>
+                        </a:spcBef>
+                        <a:spcAft>
+                          <a:spcPts val="1000"/>
+                        </a:spcAft>
+                      </a:pPr>
+                      <a:r>
+                        <a:rPr lang="en-US" sz="2400">
+                          <a:effectLst/>
+                        </a:rPr>
+                        <a:t>25.9</a:t>
+                      </a:r>
+                      <a:endParaRPr lang="en-US" sz="2400">
+                        <a:effectLst/>
+                        <a:latin typeface="Times New Roman" panose="02020603050405020304" pitchFamily="18" charset="0"/>
+                        <a:ea typeface="Times New Roman" panose="02020603050405020304" pitchFamily="18" charset="0"/>
+                      </a:endParaRPr>
+                    </a:p>
+                  </a:txBody>
+                  <a:tcPr marL="68580" marR="68580" marT="0" marB="0"/>
+                </a:tc>
+                <a:tc>
+                  <a:txBody>
+                    <a:bodyPr/>
+                    <a:lstStyle/>
+                    <a:p>
+                      <a:pPr marL="0" marR="0">
+                        <a:lnSpc>
+                          <a:spcPct val="115000"/>
+                        </a:lnSpc>
+                        <a:spcBef>
+                          <a:spcPts val="0"/>
+                        </a:spcBef>
+                        <a:spcAft>
+                          <a:spcPts val="1000"/>
+                        </a:spcAft>
+                      </a:pPr>
+                      <a:r>
+                        <a:rPr lang="en-US" sz="2400">
+                          <a:effectLst/>
+                        </a:rPr>
+                        <a:t>25.9</a:t>
+                      </a:r>
+                      <a:endParaRPr lang="en-US" sz="2400">
+                        <a:effectLst/>
+                        <a:latin typeface="Times New Roman" panose="02020603050405020304" pitchFamily="18" charset="0"/>
+                        <a:ea typeface="Times New Roman" panose="02020603050405020304" pitchFamily="18" charset="0"/>
+                      </a:endParaRPr>
+                    </a:p>
+                  </a:txBody>
+                  <a:tcPr marL="68580" marR="68580" marT="0" marB="0"/>
+                </a:tc>
+              </a:tr>
+              <a:tr h="422091">
+                <a:tc>
+                  <a:txBody>
+                    <a:bodyPr/>
+                    <a:lstStyle/>
+                    <a:p>
+                      <a:pPr marL="0" marR="0">
+                        <a:lnSpc>
+                          <a:spcPct val="115000"/>
+                        </a:lnSpc>
+                        <a:spcBef>
+                          <a:spcPts val="0"/>
+                        </a:spcBef>
+                        <a:spcAft>
+                          <a:spcPts val="1000"/>
+                        </a:spcAft>
+                      </a:pPr>
+                      <a:r>
+                        <a:rPr lang="en-US" sz="2400">
+                          <a:effectLst/>
+                        </a:rPr>
+                        <a:t>SainSmart A4988 Driver</a:t>
+                      </a:r>
+                      <a:endParaRPr lang="en-US" sz="2400">
+                        <a:effectLst/>
+                        <a:latin typeface="Times New Roman" panose="02020603050405020304" pitchFamily="18" charset="0"/>
+                        <a:ea typeface="Times New Roman" panose="02020603050405020304" pitchFamily="18" charset="0"/>
+                      </a:endParaRPr>
+                    </a:p>
+                  </a:txBody>
+                  <a:tcPr marL="68580" marR="68580" marT="0" marB="0"/>
+                </a:tc>
+                <a:tc>
+                  <a:txBody>
+                    <a:bodyPr/>
+                    <a:lstStyle/>
+                    <a:p>
+                      <a:pPr marL="0" marR="0">
+                        <a:lnSpc>
+                          <a:spcPct val="115000"/>
+                        </a:lnSpc>
+                        <a:spcBef>
+                          <a:spcPts val="0"/>
+                        </a:spcBef>
+                        <a:spcAft>
+                          <a:spcPts val="1000"/>
+                        </a:spcAft>
+                      </a:pPr>
+                      <a:r>
+                        <a:rPr lang="en-US" sz="2400">
+                          <a:effectLst/>
+                        </a:rPr>
+                        <a:t>7</a:t>
+                      </a:r>
+                      <a:endParaRPr lang="en-US" sz="2400">
+                        <a:effectLst/>
+                        <a:latin typeface="Times New Roman" panose="02020603050405020304" pitchFamily="18" charset="0"/>
+                        <a:ea typeface="Times New Roman" panose="02020603050405020304" pitchFamily="18" charset="0"/>
+                      </a:endParaRPr>
+                    </a:p>
+                  </a:txBody>
+                  <a:tcPr marL="68580" marR="68580" marT="0" marB="0"/>
+                </a:tc>
+                <a:tc>
+                  <a:txBody>
+                    <a:bodyPr/>
+                    <a:lstStyle/>
+                    <a:p>
+                      <a:pPr marL="0" marR="0">
+                        <a:lnSpc>
+                          <a:spcPct val="115000"/>
+                        </a:lnSpc>
+                        <a:spcBef>
+                          <a:spcPts val="0"/>
+                        </a:spcBef>
+                        <a:spcAft>
+                          <a:spcPts val="1000"/>
+                        </a:spcAft>
+                      </a:pPr>
+                      <a:r>
+                        <a:rPr lang="en-US" sz="2400">
+                          <a:effectLst/>
+                        </a:rPr>
+                        <a:t>10.97</a:t>
+                      </a:r>
+                      <a:endParaRPr lang="en-US" sz="2400">
+                        <a:effectLst/>
+                        <a:latin typeface="Times New Roman" panose="02020603050405020304" pitchFamily="18" charset="0"/>
+                        <a:ea typeface="Times New Roman" panose="02020603050405020304" pitchFamily="18" charset="0"/>
+                      </a:endParaRPr>
+                    </a:p>
+                  </a:txBody>
+                  <a:tcPr marL="68580" marR="68580" marT="0" marB="0"/>
+                </a:tc>
+                <a:tc>
+                  <a:txBody>
+                    <a:bodyPr/>
+                    <a:lstStyle/>
+                    <a:p>
+                      <a:pPr marL="0" marR="0">
+                        <a:lnSpc>
+                          <a:spcPct val="115000"/>
+                        </a:lnSpc>
+                        <a:spcBef>
+                          <a:spcPts val="0"/>
+                        </a:spcBef>
+                        <a:spcAft>
+                          <a:spcPts val="1000"/>
+                        </a:spcAft>
+                      </a:pPr>
+                      <a:r>
+                        <a:rPr lang="en-US" sz="2400">
+                          <a:effectLst/>
+                        </a:rPr>
+                        <a:t>76.79</a:t>
+                      </a:r>
+                      <a:endParaRPr lang="en-US" sz="2400">
+                        <a:effectLst/>
+                        <a:latin typeface="Times New Roman" panose="02020603050405020304" pitchFamily="18" charset="0"/>
+                        <a:ea typeface="Times New Roman" panose="02020603050405020304" pitchFamily="18" charset="0"/>
+                      </a:endParaRPr>
+                    </a:p>
+                  </a:txBody>
+                  <a:tcPr marL="68580" marR="68580" marT="0" marB="0"/>
+                </a:tc>
+              </a:tr>
+              <a:tr h="422091">
+                <a:tc>
+                  <a:txBody>
+                    <a:bodyPr/>
+                    <a:lstStyle/>
+                    <a:p>
+                      <a:pPr marL="0" marR="0">
+                        <a:lnSpc>
+                          <a:spcPct val="115000"/>
+                        </a:lnSpc>
+                        <a:spcBef>
+                          <a:spcPts val="0"/>
+                        </a:spcBef>
+                        <a:spcAft>
+                          <a:spcPts val="1000"/>
+                        </a:spcAft>
+                      </a:pPr>
+                      <a:r>
+                        <a:rPr lang="en-US" sz="2400">
+                          <a:effectLst/>
+                        </a:rPr>
+                        <a:t>Raspberry Pi Model B R2.0</a:t>
+                      </a:r>
+                      <a:endParaRPr lang="en-US" sz="2400">
+                        <a:effectLst/>
+                        <a:latin typeface="Times New Roman" panose="02020603050405020304" pitchFamily="18" charset="0"/>
+                        <a:ea typeface="Times New Roman" panose="02020603050405020304" pitchFamily="18" charset="0"/>
+                      </a:endParaRPr>
+                    </a:p>
+                  </a:txBody>
+                  <a:tcPr marL="68580" marR="68580" marT="0" marB="0"/>
+                </a:tc>
+                <a:tc>
+                  <a:txBody>
+                    <a:bodyPr/>
+                    <a:lstStyle/>
+                    <a:p>
+                      <a:pPr marL="0" marR="0">
+                        <a:lnSpc>
+                          <a:spcPct val="115000"/>
+                        </a:lnSpc>
+                        <a:spcBef>
+                          <a:spcPts val="0"/>
+                        </a:spcBef>
+                        <a:spcAft>
+                          <a:spcPts val="1000"/>
+                        </a:spcAft>
+                      </a:pPr>
+                      <a:r>
+                        <a:rPr lang="en-US" sz="2400">
+                          <a:effectLst/>
+                        </a:rPr>
+                        <a:t>1</a:t>
+                      </a:r>
+                      <a:endParaRPr lang="en-US" sz="2400">
+                        <a:effectLst/>
+                        <a:latin typeface="Times New Roman" panose="02020603050405020304" pitchFamily="18" charset="0"/>
+                        <a:ea typeface="Times New Roman" panose="02020603050405020304" pitchFamily="18" charset="0"/>
+                      </a:endParaRPr>
+                    </a:p>
+                  </a:txBody>
+                  <a:tcPr marL="68580" marR="68580" marT="0" marB="0"/>
+                </a:tc>
+                <a:tc>
+                  <a:txBody>
+                    <a:bodyPr/>
+                    <a:lstStyle/>
+                    <a:p>
+                      <a:pPr marL="0" marR="0">
+                        <a:lnSpc>
+                          <a:spcPct val="115000"/>
+                        </a:lnSpc>
+                        <a:spcBef>
+                          <a:spcPts val="0"/>
+                        </a:spcBef>
+                        <a:spcAft>
+                          <a:spcPts val="1000"/>
+                        </a:spcAft>
+                      </a:pPr>
+                      <a:r>
+                        <a:rPr lang="en-US" sz="2400">
+                          <a:effectLst/>
+                        </a:rPr>
+                        <a:t>39.95</a:t>
+                      </a:r>
+                      <a:endParaRPr lang="en-US" sz="2400">
+                        <a:effectLst/>
+                        <a:latin typeface="Times New Roman" panose="02020603050405020304" pitchFamily="18" charset="0"/>
+                        <a:ea typeface="Times New Roman" panose="02020603050405020304" pitchFamily="18" charset="0"/>
+                      </a:endParaRPr>
+                    </a:p>
+                  </a:txBody>
+                  <a:tcPr marL="68580" marR="68580" marT="0" marB="0"/>
+                </a:tc>
+                <a:tc>
+                  <a:txBody>
+                    <a:bodyPr/>
+                    <a:lstStyle/>
+                    <a:p>
+                      <a:pPr marL="0" marR="0">
+                        <a:lnSpc>
+                          <a:spcPct val="115000"/>
+                        </a:lnSpc>
+                        <a:spcBef>
+                          <a:spcPts val="0"/>
+                        </a:spcBef>
+                        <a:spcAft>
+                          <a:spcPts val="1000"/>
+                        </a:spcAft>
+                      </a:pPr>
+                      <a:r>
+                        <a:rPr lang="en-US" sz="2400">
+                          <a:effectLst/>
+                        </a:rPr>
+                        <a:t>39.95</a:t>
+                      </a:r>
+                      <a:endParaRPr lang="en-US" sz="2400">
+                        <a:effectLst/>
+                        <a:latin typeface="Times New Roman" panose="02020603050405020304" pitchFamily="18" charset="0"/>
+                        <a:ea typeface="Times New Roman" panose="02020603050405020304" pitchFamily="18" charset="0"/>
+                      </a:endParaRPr>
+                    </a:p>
+                  </a:txBody>
+                  <a:tcPr marL="68580" marR="68580" marT="0" marB="0"/>
+                </a:tc>
+              </a:tr>
+              <a:tr h="422091">
+                <a:tc>
+                  <a:txBody>
+                    <a:bodyPr/>
+                    <a:lstStyle/>
+                    <a:p>
+                      <a:pPr marL="0" marR="0">
+                        <a:lnSpc>
+                          <a:spcPct val="115000"/>
+                        </a:lnSpc>
+                        <a:spcBef>
+                          <a:spcPts val="0"/>
+                        </a:spcBef>
+                        <a:spcAft>
+                          <a:spcPts val="1000"/>
+                        </a:spcAft>
+                      </a:pPr>
+                      <a:r>
+                        <a:rPr lang="en-US" sz="2400">
+                          <a:effectLst/>
+                        </a:rPr>
+                        <a:t>8GB SD Flash Card</a:t>
+                      </a:r>
+                      <a:endParaRPr lang="en-US" sz="2400">
+                        <a:effectLst/>
+                        <a:latin typeface="Times New Roman" panose="02020603050405020304" pitchFamily="18" charset="0"/>
+                        <a:ea typeface="Times New Roman" panose="02020603050405020304" pitchFamily="18" charset="0"/>
+                      </a:endParaRPr>
+                    </a:p>
+                  </a:txBody>
+                  <a:tcPr marL="68580" marR="68580" marT="0" marB="0"/>
+                </a:tc>
+                <a:tc>
+                  <a:txBody>
+                    <a:bodyPr/>
+                    <a:lstStyle/>
+                    <a:p>
+                      <a:pPr marL="0" marR="0">
+                        <a:lnSpc>
+                          <a:spcPct val="115000"/>
+                        </a:lnSpc>
+                        <a:spcBef>
+                          <a:spcPts val="0"/>
+                        </a:spcBef>
+                        <a:spcAft>
+                          <a:spcPts val="1000"/>
+                        </a:spcAft>
+                      </a:pPr>
+                      <a:r>
+                        <a:rPr lang="en-US" sz="2400">
+                          <a:effectLst/>
+                        </a:rPr>
+                        <a:t>1</a:t>
+                      </a:r>
+                      <a:endParaRPr lang="en-US" sz="2400">
+                        <a:effectLst/>
+                        <a:latin typeface="Times New Roman" panose="02020603050405020304" pitchFamily="18" charset="0"/>
+                        <a:ea typeface="Times New Roman" panose="02020603050405020304" pitchFamily="18" charset="0"/>
+                      </a:endParaRPr>
+                    </a:p>
+                  </a:txBody>
+                  <a:tcPr marL="68580" marR="68580" marT="0" marB="0"/>
+                </a:tc>
+                <a:tc>
+                  <a:txBody>
+                    <a:bodyPr/>
+                    <a:lstStyle/>
+                    <a:p>
+                      <a:pPr marL="0" marR="0">
+                        <a:lnSpc>
+                          <a:spcPct val="115000"/>
+                        </a:lnSpc>
+                        <a:spcBef>
+                          <a:spcPts val="0"/>
+                        </a:spcBef>
+                        <a:spcAft>
+                          <a:spcPts val="1000"/>
+                        </a:spcAft>
+                      </a:pPr>
+                      <a:r>
+                        <a:rPr lang="en-US" sz="2400" dirty="0">
+                          <a:effectLst/>
+                        </a:rPr>
+                        <a:t>9.88</a:t>
+                      </a:r>
+                      <a:endParaRPr lang="en-US" sz="2400" dirty="0">
+                        <a:effectLst/>
+                        <a:latin typeface="Times New Roman" panose="02020603050405020304" pitchFamily="18" charset="0"/>
+                        <a:ea typeface="Times New Roman" panose="02020603050405020304" pitchFamily="18" charset="0"/>
+                      </a:endParaRPr>
+                    </a:p>
+                  </a:txBody>
+                  <a:tcPr marL="68580" marR="68580" marT="0" marB="0"/>
+                </a:tc>
+                <a:tc>
+                  <a:txBody>
+                    <a:bodyPr/>
+                    <a:lstStyle/>
+                    <a:p>
+                      <a:pPr marL="0" marR="0">
+                        <a:lnSpc>
+                          <a:spcPct val="115000"/>
+                        </a:lnSpc>
+                        <a:spcBef>
+                          <a:spcPts val="0"/>
+                        </a:spcBef>
+                        <a:spcAft>
+                          <a:spcPts val="1000"/>
+                        </a:spcAft>
+                      </a:pPr>
+                      <a:r>
+                        <a:rPr lang="en-US" sz="2400">
+                          <a:effectLst/>
+                        </a:rPr>
+                        <a:t>9.88</a:t>
+                      </a:r>
+                      <a:endParaRPr lang="en-US" sz="2400">
+                        <a:effectLst/>
+                        <a:latin typeface="Times New Roman" panose="02020603050405020304" pitchFamily="18" charset="0"/>
+                        <a:ea typeface="Times New Roman" panose="02020603050405020304" pitchFamily="18" charset="0"/>
+                      </a:endParaRPr>
+                    </a:p>
+                  </a:txBody>
+                  <a:tcPr marL="68580" marR="68580" marT="0" marB="0"/>
+                </a:tc>
+              </a:tr>
+              <a:tr h="422091">
+                <a:tc>
+                  <a:txBody>
+                    <a:bodyPr/>
+                    <a:lstStyle/>
+                    <a:p>
+                      <a:pPr marL="0" marR="0">
+                        <a:lnSpc>
+                          <a:spcPct val="115000"/>
+                        </a:lnSpc>
+                        <a:spcBef>
+                          <a:spcPts val="0"/>
+                        </a:spcBef>
+                        <a:spcAft>
+                          <a:spcPts val="1000"/>
+                        </a:spcAft>
+                      </a:pPr>
+                      <a:r>
+                        <a:rPr lang="en-US" sz="2400">
+                          <a:effectLst/>
+                        </a:rPr>
+                        <a:t>Male/Male USB 2.0 Cable</a:t>
+                      </a:r>
+                      <a:endParaRPr lang="en-US" sz="2400">
+                        <a:effectLst/>
+                        <a:latin typeface="Times New Roman" panose="02020603050405020304" pitchFamily="18" charset="0"/>
+                        <a:ea typeface="Times New Roman" panose="02020603050405020304" pitchFamily="18" charset="0"/>
+                      </a:endParaRPr>
+                    </a:p>
+                  </a:txBody>
+                  <a:tcPr marL="68580" marR="68580" marT="0" marB="0"/>
+                </a:tc>
+                <a:tc>
+                  <a:txBody>
+                    <a:bodyPr/>
+                    <a:lstStyle/>
+                    <a:p>
+                      <a:pPr marL="0" marR="0">
+                        <a:lnSpc>
+                          <a:spcPct val="115000"/>
+                        </a:lnSpc>
+                        <a:spcBef>
+                          <a:spcPts val="0"/>
+                        </a:spcBef>
+                        <a:spcAft>
+                          <a:spcPts val="1000"/>
+                        </a:spcAft>
+                      </a:pPr>
+                      <a:r>
+                        <a:rPr lang="en-US" sz="2400">
+                          <a:effectLst/>
+                        </a:rPr>
+                        <a:t>1</a:t>
+                      </a:r>
+                      <a:endParaRPr lang="en-US" sz="2400">
+                        <a:effectLst/>
+                        <a:latin typeface="Times New Roman" panose="02020603050405020304" pitchFamily="18" charset="0"/>
+                        <a:ea typeface="Times New Roman" panose="02020603050405020304" pitchFamily="18" charset="0"/>
+                      </a:endParaRPr>
+                    </a:p>
+                  </a:txBody>
+                  <a:tcPr marL="68580" marR="68580" marT="0" marB="0"/>
+                </a:tc>
+                <a:tc>
+                  <a:txBody>
+                    <a:bodyPr/>
+                    <a:lstStyle/>
+                    <a:p>
+                      <a:pPr marL="0" marR="0">
+                        <a:lnSpc>
+                          <a:spcPct val="115000"/>
+                        </a:lnSpc>
+                        <a:spcBef>
+                          <a:spcPts val="0"/>
+                        </a:spcBef>
+                        <a:spcAft>
+                          <a:spcPts val="1000"/>
+                        </a:spcAft>
+                      </a:pPr>
+                      <a:r>
+                        <a:rPr lang="en-US" sz="2400">
+                          <a:effectLst/>
+                        </a:rPr>
+                        <a:t>9.95</a:t>
+                      </a:r>
+                      <a:endParaRPr lang="en-US" sz="2400">
+                        <a:effectLst/>
+                        <a:latin typeface="Times New Roman" panose="02020603050405020304" pitchFamily="18" charset="0"/>
+                        <a:ea typeface="Times New Roman" panose="02020603050405020304" pitchFamily="18" charset="0"/>
+                      </a:endParaRPr>
+                    </a:p>
+                  </a:txBody>
+                  <a:tcPr marL="68580" marR="68580" marT="0" marB="0"/>
+                </a:tc>
+                <a:tc>
+                  <a:txBody>
+                    <a:bodyPr/>
+                    <a:lstStyle/>
+                    <a:p>
+                      <a:pPr marL="0" marR="0">
+                        <a:lnSpc>
+                          <a:spcPct val="115000"/>
+                        </a:lnSpc>
+                        <a:spcBef>
+                          <a:spcPts val="0"/>
+                        </a:spcBef>
+                        <a:spcAft>
+                          <a:spcPts val="1000"/>
+                        </a:spcAft>
+                      </a:pPr>
+                      <a:r>
+                        <a:rPr lang="en-US" sz="2400">
+                          <a:effectLst/>
+                        </a:rPr>
+                        <a:t>9.95</a:t>
+                      </a:r>
+                      <a:endParaRPr lang="en-US" sz="2400">
+                        <a:effectLst/>
+                        <a:latin typeface="Times New Roman" panose="02020603050405020304" pitchFamily="18" charset="0"/>
+                        <a:ea typeface="Times New Roman" panose="02020603050405020304" pitchFamily="18" charset="0"/>
+                      </a:endParaRPr>
+                    </a:p>
+                  </a:txBody>
+                  <a:tcPr marL="68580" marR="68580" marT="0" marB="0"/>
+                </a:tc>
+              </a:tr>
+              <a:tr h="422091">
+                <a:tc>
+                  <a:txBody>
+                    <a:bodyPr/>
+                    <a:lstStyle/>
+                    <a:p>
+                      <a:pPr marL="0" marR="0">
+                        <a:lnSpc>
+                          <a:spcPct val="115000"/>
+                        </a:lnSpc>
+                        <a:spcBef>
+                          <a:spcPts val="0"/>
+                        </a:spcBef>
+                        <a:spcAft>
+                          <a:spcPts val="1000"/>
+                        </a:spcAft>
+                      </a:pPr>
+                      <a:r>
+                        <a:rPr lang="en-US" sz="2400">
+                          <a:effectLst/>
+                        </a:rPr>
+                        <a:t>50ft. 20GA Solid Copper Interconnect</a:t>
+                      </a:r>
+                      <a:endParaRPr lang="en-US" sz="2400">
+                        <a:effectLst/>
+                        <a:latin typeface="Times New Roman" panose="02020603050405020304" pitchFamily="18" charset="0"/>
+                        <a:ea typeface="Times New Roman" panose="02020603050405020304" pitchFamily="18" charset="0"/>
+                      </a:endParaRPr>
+                    </a:p>
+                  </a:txBody>
+                  <a:tcPr marL="68580" marR="68580" marT="0" marB="0"/>
+                </a:tc>
+                <a:tc>
+                  <a:txBody>
+                    <a:bodyPr/>
+                    <a:lstStyle/>
+                    <a:p>
+                      <a:pPr marL="0" marR="0">
+                        <a:lnSpc>
+                          <a:spcPct val="115000"/>
+                        </a:lnSpc>
+                        <a:spcBef>
+                          <a:spcPts val="0"/>
+                        </a:spcBef>
+                        <a:spcAft>
+                          <a:spcPts val="1000"/>
+                        </a:spcAft>
+                      </a:pPr>
+                      <a:r>
+                        <a:rPr lang="en-US" sz="2400">
+                          <a:effectLst/>
+                        </a:rPr>
+                        <a:t>1</a:t>
+                      </a:r>
+                      <a:endParaRPr lang="en-US" sz="2400">
+                        <a:effectLst/>
+                        <a:latin typeface="Times New Roman" panose="02020603050405020304" pitchFamily="18" charset="0"/>
+                        <a:ea typeface="Times New Roman" panose="02020603050405020304" pitchFamily="18" charset="0"/>
+                      </a:endParaRPr>
+                    </a:p>
+                  </a:txBody>
+                  <a:tcPr marL="68580" marR="68580" marT="0" marB="0"/>
+                </a:tc>
+                <a:tc>
+                  <a:txBody>
+                    <a:bodyPr/>
+                    <a:lstStyle/>
+                    <a:p>
+                      <a:pPr marL="0" marR="0">
+                        <a:lnSpc>
+                          <a:spcPct val="115000"/>
+                        </a:lnSpc>
+                        <a:spcBef>
+                          <a:spcPts val="0"/>
+                        </a:spcBef>
+                        <a:spcAft>
+                          <a:spcPts val="1000"/>
+                        </a:spcAft>
+                      </a:pPr>
+                      <a:r>
+                        <a:rPr lang="en-US" sz="2400">
+                          <a:effectLst/>
+                        </a:rPr>
+                        <a:t>15.95</a:t>
+                      </a:r>
+                      <a:endParaRPr lang="en-US" sz="2400">
+                        <a:effectLst/>
+                        <a:latin typeface="Times New Roman" panose="02020603050405020304" pitchFamily="18" charset="0"/>
+                        <a:ea typeface="Times New Roman" panose="02020603050405020304" pitchFamily="18" charset="0"/>
+                      </a:endParaRPr>
+                    </a:p>
+                  </a:txBody>
+                  <a:tcPr marL="68580" marR="68580" marT="0" marB="0"/>
+                </a:tc>
+                <a:tc>
+                  <a:txBody>
+                    <a:bodyPr/>
+                    <a:lstStyle/>
+                    <a:p>
+                      <a:pPr marL="0" marR="0">
+                        <a:lnSpc>
+                          <a:spcPct val="115000"/>
+                        </a:lnSpc>
+                        <a:spcBef>
+                          <a:spcPts val="0"/>
+                        </a:spcBef>
+                        <a:spcAft>
+                          <a:spcPts val="1000"/>
+                        </a:spcAft>
+                      </a:pPr>
+                      <a:r>
+                        <a:rPr lang="en-US" sz="2400">
+                          <a:effectLst/>
+                        </a:rPr>
+                        <a:t>15.95</a:t>
+                      </a:r>
+                      <a:endParaRPr lang="en-US" sz="2400">
+                        <a:effectLst/>
+                        <a:latin typeface="Times New Roman" panose="02020603050405020304" pitchFamily="18" charset="0"/>
+                        <a:ea typeface="Times New Roman" panose="02020603050405020304" pitchFamily="18" charset="0"/>
+                      </a:endParaRPr>
+                    </a:p>
+                  </a:txBody>
+                  <a:tcPr marL="68580" marR="68580" marT="0" marB="0"/>
+                </a:tc>
+              </a:tr>
+              <a:tr h="422091">
+                <a:tc>
+                  <a:txBody>
+                    <a:bodyPr/>
+                    <a:lstStyle/>
+                    <a:p>
+                      <a:pPr marL="0" marR="0">
+                        <a:lnSpc>
+                          <a:spcPct val="115000"/>
+                        </a:lnSpc>
+                        <a:spcBef>
+                          <a:spcPts val="0"/>
+                        </a:spcBef>
+                        <a:spcAft>
+                          <a:spcPts val="1000"/>
+                        </a:spcAft>
+                      </a:pPr>
+                      <a:r>
+                        <a:rPr lang="en-US" sz="2400">
+                          <a:effectLst/>
+                        </a:rPr>
+                        <a:t>SainSmart 1602 LCD Shield</a:t>
+                      </a:r>
+                      <a:endParaRPr lang="en-US" sz="2400">
+                        <a:effectLst/>
+                        <a:latin typeface="Times New Roman" panose="02020603050405020304" pitchFamily="18" charset="0"/>
+                        <a:ea typeface="Times New Roman" panose="02020603050405020304" pitchFamily="18" charset="0"/>
+                      </a:endParaRPr>
+                    </a:p>
+                  </a:txBody>
+                  <a:tcPr marL="68580" marR="68580" marT="0" marB="0"/>
+                </a:tc>
+                <a:tc>
+                  <a:txBody>
+                    <a:bodyPr/>
+                    <a:lstStyle/>
+                    <a:p>
+                      <a:pPr marL="0" marR="0">
+                        <a:lnSpc>
+                          <a:spcPct val="115000"/>
+                        </a:lnSpc>
+                        <a:spcBef>
+                          <a:spcPts val="0"/>
+                        </a:spcBef>
+                        <a:spcAft>
+                          <a:spcPts val="1000"/>
+                        </a:spcAft>
+                      </a:pPr>
+                      <a:r>
+                        <a:rPr lang="en-US" sz="2400">
+                          <a:effectLst/>
+                        </a:rPr>
+                        <a:t>1</a:t>
+                      </a:r>
+                      <a:endParaRPr lang="en-US" sz="2400">
+                        <a:effectLst/>
+                        <a:latin typeface="Times New Roman" panose="02020603050405020304" pitchFamily="18" charset="0"/>
+                        <a:ea typeface="Times New Roman" panose="02020603050405020304" pitchFamily="18" charset="0"/>
+                      </a:endParaRPr>
+                    </a:p>
+                  </a:txBody>
+                  <a:tcPr marL="68580" marR="68580" marT="0" marB="0"/>
+                </a:tc>
+                <a:tc>
+                  <a:txBody>
+                    <a:bodyPr/>
+                    <a:lstStyle/>
+                    <a:p>
+                      <a:pPr marL="0" marR="0">
+                        <a:lnSpc>
+                          <a:spcPct val="115000"/>
+                        </a:lnSpc>
+                        <a:spcBef>
+                          <a:spcPts val="0"/>
+                        </a:spcBef>
+                        <a:spcAft>
+                          <a:spcPts val="1000"/>
+                        </a:spcAft>
+                      </a:pPr>
+                      <a:r>
+                        <a:rPr lang="en-US" sz="2400">
+                          <a:effectLst/>
+                        </a:rPr>
+                        <a:t>24.95</a:t>
+                      </a:r>
+                      <a:endParaRPr lang="en-US" sz="2400">
+                        <a:effectLst/>
+                        <a:latin typeface="Times New Roman" panose="02020603050405020304" pitchFamily="18" charset="0"/>
+                        <a:ea typeface="Times New Roman" panose="02020603050405020304" pitchFamily="18" charset="0"/>
+                      </a:endParaRPr>
+                    </a:p>
+                  </a:txBody>
+                  <a:tcPr marL="68580" marR="68580" marT="0" marB="0"/>
+                </a:tc>
+                <a:tc>
+                  <a:txBody>
+                    <a:bodyPr/>
+                    <a:lstStyle/>
+                    <a:p>
+                      <a:pPr marL="0" marR="0">
+                        <a:lnSpc>
+                          <a:spcPct val="115000"/>
+                        </a:lnSpc>
+                        <a:spcBef>
+                          <a:spcPts val="0"/>
+                        </a:spcBef>
+                        <a:spcAft>
+                          <a:spcPts val="1000"/>
+                        </a:spcAft>
+                      </a:pPr>
+                      <a:r>
+                        <a:rPr lang="en-US" sz="2400">
+                          <a:effectLst/>
+                        </a:rPr>
+                        <a:t>24.95</a:t>
+                      </a:r>
+                      <a:endParaRPr lang="en-US" sz="2400">
+                        <a:effectLst/>
+                        <a:latin typeface="Times New Roman" panose="02020603050405020304" pitchFamily="18" charset="0"/>
+                        <a:ea typeface="Times New Roman" panose="02020603050405020304" pitchFamily="18" charset="0"/>
+                      </a:endParaRPr>
+                    </a:p>
+                  </a:txBody>
+                  <a:tcPr marL="68580" marR="68580" marT="0" marB="0"/>
+                </a:tc>
+              </a:tr>
+              <a:tr h="422091">
+                <a:tc>
+                  <a:txBody>
+                    <a:bodyPr/>
+                    <a:lstStyle/>
+                    <a:p>
+                      <a:pPr marL="0" marR="0">
+                        <a:lnSpc>
+                          <a:spcPct val="115000"/>
+                        </a:lnSpc>
+                        <a:spcBef>
+                          <a:spcPts val="0"/>
+                        </a:spcBef>
+                        <a:spcAft>
+                          <a:spcPts val="1000"/>
+                        </a:spcAft>
+                      </a:pPr>
+                      <a:r>
+                        <a:rPr lang="en-US" sz="2400">
+                          <a:effectLst/>
+                        </a:rPr>
+                        <a:t>Passive Electronics Budget</a:t>
+                      </a:r>
+                      <a:endParaRPr lang="en-US" sz="2400">
+                        <a:effectLst/>
+                        <a:latin typeface="Times New Roman" panose="02020603050405020304" pitchFamily="18" charset="0"/>
+                        <a:ea typeface="Times New Roman" panose="02020603050405020304" pitchFamily="18" charset="0"/>
+                      </a:endParaRPr>
+                    </a:p>
+                  </a:txBody>
+                  <a:tcPr marL="68580" marR="68580" marT="0" marB="0"/>
+                </a:tc>
+                <a:tc>
+                  <a:txBody>
+                    <a:bodyPr/>
+                    <a:lstStyle/>
+                    <a:p>
+                      <a:pPr marL="0" marR="0">
+                        <a:lnSpc>
+                          <a:spcPct val="115000"/>
+                        </a:lnSpc>
+                        <a:spcBef>
+                          <a:spcPts val="0"/>
+                        </a:spcBef>
+                        <a:spcAft>
+                          <a:spcPts val="1000"/>
+                        </a:spcAft>
+                      </a:pPr>
+                      <a:r>
+                        <a:rPr lang="en-US" sz="2400">
+                          <a:effectLst/>
+                        </a:rPr>
+                        <a:t>1</a:t>
+                      </a:r>
+                      <a:endParaRPr lang="en-US" sz="2400">
+                        <a:effectLst/>
+                        <a:latin typeface="Times New Roman" panose="02020603050405020304" pitchFamily="18" charset="0"/>
+                        <a:ea typeface="Times New Roman" panose="02020603050405020304" pitchFamily="18" charset="0"/>
+                      </a:endParaRPr>
+                    </a:p>
+                  </a:txBody>
+                  <a:tcPr marL="68580" marR="68580" marT="0" marB="0"/>
+                </a:tc>
+                <a:tc>
+                  <a:txBody>
+                    <a:bodyPr/>
+                    <a:lstStyle/>
+                    <a:p>
+                      <a:pPr marL="0" marR="0">
+                        <a:lnSpc>
+                          <a:spcPct val="115000"/>
+                        </a:lnSpc>
+                        <a:spcBef>
+                          <a:spcPts val="0"/>
+                        </a:spcBef>
+                        <a:spcAft>
+                          <a:spcPts val="1000"/>
+                        </a:spcAft>
+                      </a:pPr>
+                      <a:r>
+                        <a:rPr lang="en-US" sz="2400">
+                          <a:effectLst/>
+                        </a:rPr>
+                        <a:t>25</a:t>
+                      </a:r>
+                      <a:endParaRPr lang="en-US" sz="2400">
+                        <a:effectLst/>
+                        <a:latin typeface="Times New Roman" panose="02020603050405020304" pitchFamily="18" charset="0"/>
+                        <a:ea typeface="Times New Roman" panose="02020603050405020304" pitchFamily="18" charset="0"/>
+                      </a:endParaRPr>
+                    </a:p>
+                  </a:txBody>
+                  <a:tcPr marL="68580" marR="68580" marT="0" marB="0"/>
+                </a:tc>
+                <a:tc>
+                  <a:txBody>
+                    <a:bodyPr/>
+                    <a:lstStyle/>
+                    <a:p>
+                      <a:pPr marL="0" marR="0">
+                        <a:lnSpc>
+                          <a:spcPct val="115000"/>
+                        </a:lnSpc>
+                        <a:spcBef>
+                          <a:spcPts val="0"/>
+                        </a:spcBef>
+                        <a:spcAft>
+                          <a:spcPts val="1000"/>
+                        </a:spcAft>
+                      </a:pPr>
+                      <a:r>
+                        <a:rPr lang="en-US" sz="2400">
+                          <a:effectLst/>
+                        </a:rPr>
+                        <a:t>25</a:t>
+                      </a:r>
+                      <a:endParaRPr lang="en-US" sz="2400">
+                        <a:effectLst/>
+                        <a:latin typeface="Times New Roman" panose="02020603050405020304" pitchFamily="18" charset="0"/>
+                        <a:ea typeface="Times New Roman" panose="02020603050405020304" pitchFamily="18" charset="0"/>
+                      </a:endParaRPr>
+                    </a:p>
+                  </a:txBody>
+                  <a:tcPr marL="68580" marR="68580" marT="0" marB="0"/>
+                </a:tc>
+              </a:tr>
+              <a:tr h="422091">
+                <a:tc>
+                  <a:txBody>
+                    <a:bodyPr/>
+                    <a:lstStyle/>
+                    <a:p>
+                      <a:pPr marL="0" marR="0">
+                        <a:lnSpc>
+                          <a:spcPct val="115000"/>
+                        </a:lnSpc>
+                        <a:spcBef>
+                          <a:spcPts val="0"/>
+                        </a:spcBef>
+                        <a:spcAft>
+                          <a:spcPts val="1000"/>
+                        </a:spcAft>
+                      </a:pPr>
+                      <a:r>
+                        <a:rPr lang="en-US" sz="2400">
+                          <a:effectLst/>
+                        </a:rPr>
+                        <a:t>Total</a:t>
+                      </a:r>
+                      <a:endParaRPr lang="en-US" sz="2400">
+                        <a:effectLst/>
+                        <a:latin typeface="Times New Roman" panose="02020603050405020304" pitchFamily="18" charset="0"/>
+                        <a:ea typeface="Times New Roman" panose="02020603050405020304" pitchFamily="18" charset="0"/>
+                      </a:endParaRPr>
+                    </a:p>
+                  </a:txBody>
+                  <a:tcPr marL="68580" marR="68580" marT="0" marB="0"/>
+                </a:tc>
+                <a:tc>
+                  <a:txBody>
+                    <a:bodyPr/>
+                    <a:lstStyle/>
+                    <a:p>
+                      <a:endParaRPr lang="en-US" sz="1600">
+                        <a:effectLst/>
+                        <a:latin typeface="Times New Roman" panose="02020603050405020304" pitchFamily="18" charset="0"/>
+                      </a:endParaRPr>
+                    </a:p>
+                  </a:txBody>
+                  <a:tcPr marL="68580" marR="68580" marT="0" marB="0"/>
+                </a:tc>
+                <a:tc>
+                  <a:txBody>
+                    <a:bodyPr/>
+                    <a:lstStyle/>
+                    <a:p>
+                      <a:endParaRPr lang="en-US" sz="1600">
+                        <a:effectLst/>
+                        <a:latin typeface="Times New Roman" panose="02020603050405020304" pitchFamily="18" charset="0"/>
+                      </a:endParaRPr>
+                    </a:p>
+                  </a:txBody>
+                  <a:tcPr marL="68580" marR="68580" marT="0" marB="0"/>
+                </a:tc>
+                <a:tc>
+                  <a:txBody>
+                    <a:bodyPr/>
+                    <a:lstStyle/>
+                    <a:p>
+                      <a:pPr marL="0" marR="0">
+                        <a:lnSpc>
+                          <a:spcPct val="115000"/>
+                        </a:lnSpc>
+                        <a:spcBef>
+                          <a:spcPts val="0"/>
+                        </a:spcBef>
+                        <a:spcAft>
+                          <a:spcPts val="1000"/>
+                        </a:spcAft>
+                      </a:pPr>
+                      <a:r>
+                        <a:rPr lang="en-US" sz="2400" dirty="0">
+                          <a:effectLst/>
+                        </a:rPr>
+                        <a:t>271.54</a:t>
+                      </a:r>
+                      <a:endParaRPr lang="en-US" sz="2400" dirty="0">
+                        <a:effectLst/>
+                        <a:latin typeface="Times New Roman" panose="02020603050405020304" pitchFamily="18" charset="0"/>
+                        <a:ea typeface="Times New Roman" panose="02020603050405020304" pitchFamily="18" charset="0"/>
+                      </a:endParaRPr>
+                    </a:p>
+                  </a:txBody>
+                  <a:tcPr marL="68580" marR="68580" marT="0" marB="0"/>
+                </a:tc>
+              </a:tr>
+            </a:tbl>
+          </a:graphicData>
+        </a:graphic>
+      </p:graphicFrame>
+    </p:spTree>
+    <p:extLst>
+      <p:ext uri="{BB962C8B-B14F-4D97-AF65-F5344CB8AC3E}">
+        <p14:creationId xmlns:p14="http://schemas.microsoft.com/office/powerpoint/2010/main" val="2713793486"/>
+      </p:ext>
+    </p:extLst>
+  </p:cSld>
+  <p:clrMapOvr>
+    <a:masterClrMapping/>
+  </p:clrMapOvr>
+</p:sld>
+</file>
+
+<file path=ppt/slides/slide31.xml><?xml version="1.0" encoding="utf-8"?>
+<p:sld xmlns:a="http://schemas.openxmlformats.org/drawingml/2006/main" xmlns:r="http://schemas.openxmlformats.org/officeDocument/2006/relationships" xmlns:p="http://schemas.openxmlformats.org/presentationml/2006/main">
+  <p:cSld>
+    <p:spTree>
+      <p:nvGrpSpPr>
+        <p:cNvPr id="1" name=""/>
+        <p:cNvGrpSpPr/>
+        <p:nvPr/>
+      </p:nvGrpSpPr>
+      <p:grpSpPr>
+        <a:xfrm>
+          <a:off x="0" y="0"/>
+          <a:ext cx="0" cy="0"/>
+          <a:chOff x="0" y="0"/>
+          <a:chExt cx="0" cy="0"/>
+        </a:xfrm>
+      </p:grpSpPr>
+      <p:sp>
+        <p:nvSpPr>
+          <p:cNvPr id="2" name="Title 1"/>
+          <p:cNvSpPr>
+            <a:spLocks noGrp="1"/>
+          </p:cNvSpPr>
+          <p:nvPr>
+            <p:ph type="title"/>
+          </p:nvPr>
+        </p:nvSpPr>
+        <p:spPr/>
+        <p:txBody>
+          <a:bodyPr/>
+          <a:lstStyle/>
+          <a:p>
+            <a:endParaRPr lang="en-US"/>
+          </a:p>
+        </p:txBody>
+      </p:sp>
+      <p:sp>
+        <p:nvSpPr>
+          <p:cNvPr id="3" name="Content Placeholder 2"/>
+          <p:cNvSpPr>
+            <a:spLocks noGrp="1"/>
+          </p:cNvSpPr>
+          <p:nvPr>
+            <p:ph idx="1"/>
+          </p:nvPr>
+        </p:nvSpPr>
+        <p:spPr/>
+        <p:txBody>
+          <a:bodyPr/>
+          <a:lstStyle/>
+          <a:p>
+            <a:endParaRPr lang="en-US"/>
+          </a:p>
+        </p:txBody>
+      </p:sp>
+    </p:spTree>
+    <p:extLst>
+      <p:ext uri="{BB962C8B-B14F-4D97-AF65-F5344CB8AC3E}">
+        <p14:creationId xmlns:p14="http://schemas.microsoft.com/office/powerpoint/2010/main" val="3913702342"/>
       </p:ext>
     </p:extLst>
   </p:cSld>

</xml_diff>

<commit_message>
SRS Pres and File
</commit_message>
<xml_diff>
--- a/SRS Presentation/SRS Presentation.pptx
+++ b/SRS Presentation/SRS Presentation.pptx
@@ -24,8 +24,9 @@
     <p:sldId id="278" r:id="rId18"/>
     <p:sldId id="279" r:id="rId19"/>
     <p:sldId id="280" r:id="rId20"/>
-    <p:sldId id="263" r:id="rId21"/>
-    <p:sldId id="261" r:id="rId22"/>
+    <p:sldId id="281" r:id="rId21"/>
+    <p:sldId id="263" r:id="rId22"/>
+    <p:sldId id="261" r:id="rId23"/>
   </p:sldIdLst>
   <p:sldSz cx="12192000" cy="6858000"/>
   <p:notesSz cx="6858000" cy="9144000"/>
@@ -3232,11 +3233,7 @@
             </a:br>
             <a:r>
               <a:rPr lang="en-US" dirty="0" smtClean="0"/>
-              <a:t>SRS Gate </a:t>
-            </a:r>
-            <a:r>
-              <a:rPr lang="en-US" dirty="0" smtClean="0"/>
-              <a:t>Review</a:t>
+              <a:t>SRS Gate Review</a:t>
             </a:r>
             <a:endParaRPr lang="en-US" dirty="0"/>
           </a:p>
@@ -5610,7 +5607,11 @@
           <a:p>
             <a:r>
               <a:rPr lang="en-US" dirty="0" smtClean="0"/>
-              <a:t>Other Requirements</a:t>
+              <a:t>Other </a:t>
+            </a:r>
+            <a:r>
+              <a:rPr lang="en-US" dirty="0" smtClean="0"/>
+              <a:t>Requirements : Safety</a:t>
             </a:r>
             <a:endParaRPr lang="en-US" dirty="0"/>
           </a:p>
@@ -5628,26 +5629,26 @@
         </p:nvSpPr>
         <p:spPr>
           <a:xfrm>
-            <a:off x="609600" y="1284514"/>
-            <a:ext cx="10160000" cy="5334000"/>
+            <a:off x="609599" y="1284514"/>
+            <a:ext cx="10765971" cy="5334000"/>
           </a:xfrm>
         </p:spPr>
         <p:txBody>
           <a:bodyPr>
-            <a:normAutofit/>
+            <a:normAutofit fontScale="92500" lnSpcReduction="20000"/>
           </a:bodyPr>
           <a:lstStyle/>
           <a:p>
             <a:r>
               <a:rPr lang="en-US" b="1" dirty="0"/>
-              <a:t>5.5	Real Time Sensor Monitoring</a:t>
-            </a:r>
-          </a:p>
-          <a:p>
-            <a:pPr lvl="1"/>
-            <a:r>
-              <a:rPr lang="en-US" b="1" dirty="0" smtClean="0"/>
-              <a:t>5.5.1</a:t>
+              <a:t>6.1	Temperature Cutoff Threshold</a:t>
+            </a:r>
+          </a:p>
+          <a:p>
+            <a:pPr lvl="1"/>
+            <a:r>
+              <a:rPr lang="en-US" b="1" dirty="0" smtClean="0"/>
+              <a:t>6.1.1</a:t>
             </a:r>
             <a:r>
               <a:rPr lang="en-US" b="1" dirty="0"/>
@@ -5655,27 +5656,35 @@
             </a:r>
             <a:r>
               <a:rPr lang="en-US" dirty="0"/>
-              <a:t>  The system shall monitor data from sensors in real time during </a:t>
-            </a:r>
-            <a:r>
-              <a:rPr lang="en-US" dirty="0" smtClean="0"/>
-              <a:t>			         operation</a:t>
-            </a:r>
-            <a:r>
-              <a:rPr lang="en-US" dirty="0"/>
-              <a:t>.  The sensor data must be monitored in real time to </a:t>
-            </a:r>
-            <a:r>
-              <a:rPr lang="en-US" dirty="0" smtClean="0"/>
-              <a:t>			         ensure </a:t>
-            </a:r>
-            <a:r>
-              <a:rPr lang="en-US" dirty="0"/>
-              <a:t>proper printer functionality as well as enforce safety </a:t>
-            </a:r>
-            <a:r>
-              <a:rPr lang="en-US" dirty="0" smtClean="0"/>
-              <a:t>			         systems</a:t>
+              <a:t>  The system shall include a temperature cutoff threshold for </a:t>
+            </a:r>
+            <a:r>
+              <a:rPr lang="en-US" dirty="0" smtClean="0"/>
+              <a:t>the printer 			        head</a:t>
+            </a:r>
+            <a:r>
+              <a:rPr lang="en-US" dirty="0"/>
+              <a:t>.  If the temperature of the printer head reaches the </a:t>
+            </a:r>
+            <a:r>
+              <a:rPr lang="en-US" dirty="0" smtClean="0"/>
+              <a:t>cutoff 				        temperature</a:t>
+            </a:r>
+            <a:r>
+              <a:rPr lang="en-US" dirty="0"/>
+              <a:t>, the system will abort the operation and shut off </a:t>
+            </a:r>
+            <a:r>
+              <a:rPr lang="en-US" dirty="0" smtClean="0"/>
+              <a:t> the </a:t>
+            </a:r>
+            <a:r>
+              <a:rPr lang="en-US" dirty="0"/>
+              <a:t>heating </a:t>
+            </a:r>
+            <a:r>
+              <a:rPr lang="en-US" dirty="0" smtClean="0"/>
+              <a:t>			        device</a:t>
             </a:r>
             <a:r>
               <a:rPr lang="en-US" dirty="0"/>
@@ -5686,7 +5695,7 @@
             <a:pPr lvl="1"/>
             <a:r>
               <a:rPr lang="en-US" b="1" dirty="0" smtClean="0"/>
-              <a:t>5.5.2</a:t>
+              <a:t>6.1.2</a:t>
             </a:r>
             <a:r>
               <a:rPr lang="en-US" b="1" dirty="0"/>
@@ -5701,7 +5710,7 @@
             <a:pPr lvl="1"/>
             <a:r>
               <a:rPr lang="en-US" b="1" dirty="0" smtClean="0"/>
-              <a:t>5.5.3</a:t>
+              <a:t>6.1.3</a:t>
             </a:r>
             <a:r>
               <a:rPr lang="en-US" b="1" dirty="0"/>
@@ -5709,22 +5718,22 @@
             </a:r>
             <a:r>
               <a:rPr lang="en-US" dirty="0"/>
-              <a:t>  Constant monitoring of sensors could require expensive </a:t>
-            </a:r>
-            <a:r>
-              <a:rPr lang="en-US" dirty="0" smtClean="0"/>
-              <a:t>				        processing </a:t>
-            </a:r>
-            <a:r>
-              <a:rPr lang="en-US" dirty="0"/>
-              <a:t>and memory resources.</a:t>
-            </a:r>
-          </a:p>
-          <a:p>
-            <a:pPr lvl="1"/>
-            <a:r>
-              <a:rPr lang="en-US" b="1" dirty="0" smtClean="0"/>
-              <a:t>5.5.4 </a:t>
+              <a:t>  The system must be able to accurately monitor the temperature of </a:t>
+            </a:r>
+            <a:r>
+              <a:rPr lang="en-US" dirty="0" smtClean="0"/>
+              <a:t>			        	        each </a:t>
+            </a:r>
+            <a:r>
+              <a:rPr lang="en-US" dirty="0"/>
+              <a:t>printing head.</a:t>
+            </a:r>
+          </a:p>
+          <a:p>
+            <a:pPr lvl="1"/>
+            <a:r>
+              <a:rPr lang="en-US" b="1" dirty="0" smtClean="0"/>
+              <a:t>6.1.4 </a:t>
             </a:r>
             <a:r>
               <a:rPr lang="en-US" b="1" dirty="0"/>
@@ -5739,7 +5748,7 @@
             <a:pPr lvl="1"/>
             <a:r>
               <a:rPr lang="en-US" b="1" dirty="0" smtClean="0"/>
-              <a:t>5.5.5</a:t>
+              <a:t>6.1.5</a:t>
             </a:r>
             <a:r>
               <a:rPr lang="en-US" b="1" dirty="0"/>
@@ -5747,10 +5756,133 @@
             </a:r>
             <a:r>
               <a:rPr lang="en-US" dirty="0"/>
-              <a:t> 2 – High</a:t>
-            </a:r>
-          </a:p>
-          <a:p>
+              <a:t> 1 – Critical</a:t>
+            </a:r>
+          </a:p>
+          <a:p>
+            <a:r>
+              <a:rPr lang="en-US" b="1" dirty="0"/>
+              <a:t>6.2	Printing Area Restrictions</a:t>
+            </a:r>
+          </a:p>
+          <a:p>
+            <a:pPr lvl="1"/>
+            <a:r>
+              <a:rPr lang="en-US" b="1" dirty="0" smtClean="0"/>
+              <a:t>6.2.1</a:t>
+            </a:r>
+            <a:r>
+              <a:rPr lang="en-US" b="1" dirty="0"/>
+              <a:t>	Description:</a:t>
+            </a:r>
+            <a:r>
+              <a:rPr lang="en-US" dirty="0"/>
+              <a:t>  The system shall only extrude material within a configured area. </a:t>
+            </a:r>
+            <a:r>
+              <a:rPr lang="en-US" dirty="0" smtClean="0"/>
+              <a:t>Material 			        extruded </a:t>
+            </a:r>
+            <a:r>
+              <a:rPr lang="en-US" dirty="0"/>
+              <a:t>by the printer will be at a high temperature and </a:t>
+            </a:r>
+            <a:r>
+              <a:rPr lang="en-US" dirty="0" smtClean="0"/>
+              <a:t> may </a:t>
+            </a:r>
+            <a:r>
+              <a:rPr lang="en-US" dirty="0"/>
+              <a:t>cause harm </a:t>
+            </a:r>
+            <a:r>
+              <a:rPr lang="en-US" dirty="0" smtClean="0"/>
+              <a:t>			        to </a:t>
+            </a:r>
+            <a:r>
+              <a:rPr lang="en-US" dirty="0"/>
+              <a:t>the printer’s surroundings; therefore it is </a:t>
+            </a:r>
+            <a:r>
+              <a:rPr lang="en-US" dirty="0" smtClean="0"/>
+              <a:t>important </a:t>
+            </a:r>
+            <a:r>
+              <a:rPr lang="en-US" dirty="0"/>
+              <a:t>to ensure that the </a:t>
+            </a:r>
+            <a:r>
+              <a:rPr lang="en-US" dirty="0" smtClean="0"/>
+              <a:t>			        material </a:t>
+            </a:r>
+            <a:r>
+              <a:rPr lang="en-US" dirty="0"/>
+              <a:t>is only extruded in a specified safe area.</a:t>
+            </a:r>
+          </a:p>
+          <a:p>
+            <a:pPr lvl="1"/>
+            <a:r>
+              <a:rPr lang="en-US" b="1" dirty="0" smtClean="0"/>
+              <a:t>6.2.2</a:t>
+            </a:r>
+            <a:r>
+              <a:rPr lang="en-US" b="1" dirty="0"/>
+              <a:t>	Source:</a:t>
+            </a:r>
+            <a:r>
+              <a:rPr lang="en-US" dirty="0"/>
+              <a:t>  Tim Edmondson (Team Member)</a:t>
+            </a:r>
+          </a:p>
+          <a:p>
+            <a:pPr lvl="1"/>
+            <a:r>
+              <a:rPr lang="en-US" b="1" dirty="0" smtClean="0"/>
+              <a:t>6.2.3</a:t>
+            </a:r>
+            <a:r>
+              <a:rPr lang="en-US" b="1" dirty="0"/>
+              <a:t>	Constraints:</a:t>
+            </a:r>
+            <a:r>
+              <a:rPr lang="en-US" dirty="0"/>
+              <a:t>  None</a:t>
+            </a:r>
+          </a:p>
+          <a:p>
+            <a:pPr lvl="1"/>
+            <a:r>
+              <a:rPr lang="en-US" b="1" dirty="0" smtClean="0"/>
+              <a:t>6.2.4 </a:t>
+            </a:r>
+            <a:r>
+              <a:rPr lang="en-US" b="1" dirty="0"/>
+              <a:t>	Standards:</a:t>
+            </a:r>
+            <a:r>
+              <a:rPr lang="en-US" dirty="0"/>
+              <a:t>  None</a:t>
+            </a:r>
+          </a:p>
+          <a:p>
+            <a:pPr lvl="1"/>
+            <a:r>
+              <a:rPr lang="en-US" b="1" dirty="0" smtClean="0"/>
+              <a:t>6.2.5</a:t>
+            </a:r>
+            <a:r>
+              <a:rPr lang="en-US" b="1" dirty="0"/>
+              <a:t>	Priority:</a:t>
+            </a:r>
+            <a:r>
+              <a:rPr lang="en-US" dirty="0"/>
+              <a:t> 1 – </a:t>
+            </a:r>
+            <a:r>
+              <a:rPr lang="en-US" dirty="0" smtClean="0"/>
+              <a:t>Critical</a:t>
+            </a:r>
             <a:endParaRPr lang="en-US" dirty="0"/>
           </a:p>
         </p:txBody>
@@ -5918,6 +6050,235 @@
 </file>
 
 <file path=ppt/slides/slide20.xml><?xml version="1.0" encoding="utf-8"?>
+<p:sld xmlns:a="http://schemas.openxmlformats.org/drawingml/2006/main" xmlns:r="http://schemas.openxmlformats.org/officeDocument/2006/relationships" xmlns:p="http://schemas.openxmlformats.org/presentationml/2006/main">
+  <p:cSld>
+    <p:spTree>
+      <p:nvGrpSpPr>
+        <p:cNvPr id="1" name=""/>
+        <p:cNvGrpSpPr/>
+        <p:nvPr/>
+      </p:nvGrpSpPr>
+      <p:grpSpPr>
+        <a:xfrm>
+          <a:off x="0" y="0"/>
+          <a:ext cx="0" cy="0"/>
+          <a:chOff x="0" y="0"/>
+          <a:chExt cx="0" cy="0"/>
+        </a:xfrm>
+      </p:grpSpPr>
+      <p:sp>
+        <p:nvSpPr>
+          <p:cNvPr id="2" name="Title 1"/>
+          <p:cNvSpPr>
+            <a:spLocks noGrp="1"/>
+          </p:cNvSpPr>
+          <p:nvPr>
+            <p:ph type="title"/>
+          </p:nvPr>
+        </p:nvSpPr>
+        <p:spPr>
+          <a:xfrm>
+            <a:off x="130628" y="274638"/>
+            <a:ext cx="11462657" cy="1143000"/>
+          </a:xfrm>
+        </p:spPr>
+        <p:txBody>
+          <a:bodyPr/>
+          <a:lstStyle/>
+          <a:p>
+            <a:r>
+              <a:rPr lang="en-US" sz="4500" dirty="0" smtClean="0"/>
+              <a:t>Other </a:t>
+            </a:r>
+            <a:r>
+              <a:rPr lang="en-US" sz="4500" dirty="0" smtClean="0"/>
+              <a:t>Requirements: Maintenance and Support</a:t>
+            </a:r>
+            <a:endParaRPr lang="en-US" sz="4500" dirty="0"/>
+          </a:p>
+        </p:txBody>
+      </p:sp>
+      <p:sp>
+        <p:nvSpPr>
+          <p:cNvPr id="3" name="Content Placeholder 2"/>
+          <p:cNvSpPr>
+            <a:spLocks noGrp="1"/>
+          </p:cNvSpPr>
+          <p:nvPr>
+            <p:ph idx="1"/>
+          </p:nvPr>
+        </p:nvSpPr>
+        <p:spPr>
+          <a:xfrm>
+            <a:off x="609599" y="1284514"/>
+            <a:ext cx="10765971" cy="5334000"/>
+          </a:xfrm>
+        </p:spPr>
+        <p:txBody>
+          <a:bodyPr>
+            <a:normAutofit fontScale="92500" lnSpcReduction="20000"/>
+          </a:bodyPr>
+          <a:lstStyle/>
+          <a:p>
+            <a:r>
+              <a:rPr lang="en-US" b="1" dirty="0"/>
+              <a:t>7.1	 Host Software Manual</a:t>
+            </a:r>
+          </a:p>
+          <a:p>
+            <a:r>
+              <a:rPr lang="en-US" b="1" dirty="0"/>
+              <a:t>	7.1.1	Description</a:t>
+            </a:r>
+            <a:r>
+              <a:rPr lang="en-US" dirty="0"/>
+              <a:t>:  A manual that details the operation of the host software shall be provided.  Here, “host software” is that software which is run on the workstation that generates machine instructions for the printing hardware.  The manual must detail common troubleshooting issues as well as provide basic usage instructions.</a:t>
+            </a:r>
+          </a:p>
+          <a:p>
+            <a:r>
+              <a:rPr lang="en-US" dirty="0"/>
+              <a:t>	</a:t>
+            </a:r>
+            <a:r>
+              <a:rPr lang="en-US" b="1" dirty="0"/>
+              <a:t>7.1.2	Source:</a:t>
+            </a:r>
+            <a:r>
+              <a:rPr lang="en-US" dirty="0"/>
+              <a:t>  Shawn Simonson (Team Member)</a:t>
+            </a:r>
+          </a:p>
+          <a:p>
+            <a:r>
+              <a:rPr lang="en-US" dirty="0"/>
+              <a:t>	</a:t>
+            </a:r>
+            <a:r>
+              <a:rPr lang="en-US" b="1" dirty="0"/>
+              <a:t>7.1.3	Constraints:</a:t>
+            </a:r>
+            <a:r>
+              <a:rPr lang="en-US" dirty="0"/>
+              <a:t>  None</a:t>
+            </a:r>
+          </a:p>
+          <a:p>
+            <a:r>
+              <a:rPr lang="en-US" dirty="0"/>
+              <a:t>	</a:t>
+            </a:r>
+            <a:r>
+              <a:rPr lang="en-US" b="1" dirty="0"/>
+              <a:t>7.1.4 	Standards:</a:t>
+            </a:r>
+            <a:r>
+              <a:rPr lang="en-US" dirty="0"/>
+              <a:t>  None</a:t>
+            </a:r>
+          </a:p>
+          <a:p>
+            <a:r>
+              <a:rPr lang="en-US" dirty="0"/>
+              <a:t>	</a:t>
+            </a:r>
+            <a:r>
+              <a:rPr lang="en-US" b="1" dirty="0"/>
+              <a:t>7.1.5	Priority:</a:t>
+            </a:r>
+            <a:r>
+              <a:rPr lang="en-US" dirty="0"/>
+              <a:t>  1 – Critical</a:t>
+            </a:r>
+          </a:p>
+          <a:p>
+            <a:r>
+              <a:rPr lang="en-US" b="1" dirty="0"/>
+              <a:t>7.2	 Source Code Documentation</a:t>
+            </a:r>
+          </a:p>
+          <a:p>
+            <a:r>
+              <a:rPr lang="en-US" b="1" dirty="0"/>
+              <a:t>	7.2.1	Description</a:t>
+            </a:r>
+            <a:r>
+              <a:rPr lang="en-US" dirty="0"/>
+              <a:t>:  The source code developed by the software team shall be well documented with comments explaining the functionality of all modules and any non-obvious code.  This documentation is intended to support any future development on the system.</a:t>
+            </a:r>
+          </a:p>
+          <a:p>
+            <a:r>
+              <a:rPr lang="en-US" dirty="0"/>
+              <a:t>	</a:t>
+            </a:r>
+            <a:r>
+              <a:rPr lang="en-US" b="1" dirty="0"/>
+              <a:t>7.2.2	Source:</a:t>
+            </a:r>
+            <a:r>
+              <a:rPr lang="en-US" dirty="0"/>
+              <a:t>  Tim Edmondson (Team Member)</a:t>
+            </a:r>
+          </a:p>
+          <a:p>
+            <a:r>
+              <a:rPr lang="en-US" dirty="0"/>
+              <a:t>	</a:t>
+            </a:r>
+            <a:r>
+              <a:rPr lang="en-US" b="1" dirty="0"/>
+              <a:t>7.2.3	Constraints:</a:t>
+            </a:r>
+            <a:r>
+              <a:rPr lang="en-US" dirty="0"/>
+              <a:t>  None</a:t>
+            </a:r>
+          </a:p>
+          <a:p>
+            <a:r>
+              <a:rPr lang="en-US" dirty="0"/>
+              <a:t>	</a:t>
+            </a:r>
+            <a:r>
+              <a:rPr lang="en-US" b="1" dirty="0"/>
+              <a:t>7.2.4 	Standards:</a:t>
+            </a:r>
+            <a:r>
+              <a:rPr lang="en-US" dirty="0"/>
+              <a:t>  None</a:t>
+            </a:r>
+          </a:p>
+          <a:p>
+            <a:r>
+              <a:rPr lang="en-US" dirty="0"/>
+              <a:t>	</a:t>
+            </a:r>
+            <a:r>
+              <a:rPr lang="en-US" b="1" dirty="0"/>
+              <a:t>7.2.5	Priority:</a:t>
+            </a:r>
+            <a:r>
+              <a:rPr lang="en-US" dirty="0"/>
+              <a:t>  2 – High</a:t>
+            </a:r>
+          </a:p>
+        </p:txBody>
+      </p:sp>
+    </p:spTree>
+    <p:extLst>
+      <p:ext uri="{BB962C8B-B14F-4D97-AF65-F5344CB8AC3E}">
+        <p14:creationId xmlns:p14="http://schemas.microsoft.com/office/powerpoint/2010/main" val="2308210321"/>
+      </p:ext>
+    </p:extLst>
+  </p:cSld>
+  <p:clrMapOvr>
+    <a:masterClrMapping/>
+  </p:clrMapOvr>
+</p:sld>
+</file>
+
+<file path=ppt/slides/slide21.xml><?xml version="1.0" encoding="utf-8"?>
 <p:sld xmlns:a="http://schemas.openxmlformats.org/drawingml/2006/main" xmlns:r="http://schemas.openxmlformats.org/officeDocument/2006/relationships" xmlns:p="http://schemas.openxmlformats.org/presentationml/2006/main">
   <p:cSld>
     <p:spTree>
@@ -6024,7 +6385,7 @@
 </p:sld>
 </file>
 
-<file path=ppt/slides/slide21.xml><?xml version="1.0" encoding="utf-8"?>
+<file path=ppt/slides/slide22.xml><?xml version="1.0" encoding="utf-8"?>
 <p:sld xmlns:a="http://schemas.openxmlformats.org/drawingml/2006/main" xmlns:r="http://schemas.openxmlformats.org/officeDocument/2006/relationships" xmlns:p="http://schemas.openxmlformats.org/presentationml/2006/main">
   <p:cSld>
     <p:spTree>
@@ -7764,11 +8125,7 @@
             </a:r>
             <a:r>
               <a:rPr lang="en-US" dirty="0"/>
-              <a:t>  </a:t>
-            </a:r>
-            <a:r>
-              <a:rPr lang="en-US" dirty="0"/>
-              <a:t>Dr. </a:t>
+              <a:t>  Dr. </a:t>
             </a:r>
             <a:r>
               <a:rPr lang="en-US" dirty="0" err="1"/>
@@ -7881,11 +8238,7 @@
             </a:r>
             <a:r>
               <a:rPr lang="en-US" dirty="0"/>
-              <a:t>  </a:t>
-            </a:r>
-            <a:r>
-              <a:rPr lang="en-US" dirty="0"/>
-              <a:t>Dr. </a:t>
+              <a:t>  Dr. </a:t>
             </a:r>
             <a:r>
               <a:rPr lang="en-US" dirty="0" err="1"/>

</xml_diff>

<commit_message>
Updated SRS Gate Presentation
</commit_message>
<xml_diff>
--- a/SRS Presentation/SRS Presentation.pptx
+++ b/SRS Presentation/SRS Presentation.pptx
@@ -25,8 +25,13 @@
     <p:sldId id="279" r:id="rId19"/>
     <p:sldId id="280" r:id="rId20"/>
     <p:sldId id="281" r:id="rId21"/>
-    <p:sldId id="263" r:id="rId22"/>
-    <p:sldId id="261" r:id="rId23"/>
+    <p:sldId id="282" r:id="rId22"/>
+    <p:sldId id="283" r:id="rId23"/>
+    <p:sldId id="284" r:id="rId24"/>
+    <p:sldId id="285" r:id="rId25"/>
+    <p:sldId id="286" r:id="rId26"/>
+    <p:sldId id="263" r:id="rId27"/>
+    <p:sldId id="261" r:id="rId28"/>
   </p:sldIdLst>
   <p:sldSz cx="12192000" cy="6858000"/>
   <p:notesSz cx="6858000" cy="9144000"/>
@@ -5607,11 +5612,7 @@
           <a:p>
             <a:r>
               <a:rPr lang="en-US" dirty="0" smtClean="0"/>
-              <a:t>Other </a:t>
-            </a:r>
-            <a:r>
-              <a:rPr lang="en-US" dirty="0" smtClean="0"/>
-              <a:t>Requirements : Safety</a:t>
+              <a:t>Other Requirements : Safety</a:t>
             </a:r>
             <a:endParaRPr lang="en-US" dirty="0"/>
           </a:p>
@@ -6088,11 +6089,7 @@
           <a:p>
             <a:r>
               <a:rPr lang="en-US" sz="4500" dirty="0" smtClean="0"/>
-              <a:t>Other </a:t>
-            </a:r>
-            <a:r>
-              <a:rPr lang="en-US" sz="4500" dirty="0" smtClean="0"/>
-              <a:t>Requirements: Maintenance and Support</a:t>
+              <a:t>Other Requirements: Maintenance and Support</a:t>
             </a:r>
             <a:endParaRPr lang="en-US" sz="4500" dirty="0"/>
           </a:p>
@@ -6126,23 +6123,93 @@
             </a:r>
           </a:p>
           <a:p>
-            <a:r>
-              <a:rPr lang="en-US" b="1" dirty="0"/>
-              <a:t>	7.1.1	Description</a:t>
-            </a:r>
-            <a:r>
-              <a:rPr lang="en-US" dirty="0"/>
-              <a:t>:  A manual that details the operation of the host software shall be provided.  Here, “host software” is that software which is run on the workstation that generates machine instructions for the printing hardware.  The manual must detail common troubleshooting issues as well as provide basic usage instructions.</a:t>
-            </a:r>
-          </a:p>
-          <a:p>
-            <a:r>
-              <a:rPr lang="en-US" dirty="0"/>
-              <a:t>	</a:t>
-            </a:r>
-            <a:r>
-              <a:rPr lang="en-US" b="1" dirty="0"/>
-              <a:t>7.1.2	Source:</a:t>
+            <a:pPr lvl="1"/>
+            <a:r>
+              <a:rPr lang="en-US" b="1" dirty="0" smtClean="0"/>
+              <a:t>7.1.1</a:t>
+            </a:r>
+            <a:r>
+              <a:rPr lang="en-US" b="1" dirty="0"/>
+              <a:t>	Description</a:t>
+            </a:r>
+            <a:r>
+              <a:rPr lang="en-US" dirty="0"/>
+              <a:t>:  A manual that details the operation of the host software shall be </a:t>
+            </a:r>
+            <a:r>
+              <a:rPr lang="en-US" dirty="0" smtClean="0"/>
+              <a:t>provided</a:t>
+            </a:r>
+            <a:r>
+              <a:rPr lang="en-US" dirty="0"/>
+              <a:t>.  </a:t>
+            </a:r>
+            <a:r>
+              <a:rPr lang="en-US" dirty="0" smtClean="0"/>
+              <a:t>			       Here</a:t>
+            </a:r>
+            <a:r>
+              <a:rPr lang="en-US" dirty="0"/>
+              <a:t>, “host software” is that software which is run on the </a:t>
+            </a:r>
+            <a:r>
+              <a:rPr lang="en-US" dirty="0" smtClean="0"/>
+              <a:t>workstation </a:t>
+            </a:r>
+            <a:r>
+              <a:rPr lang="en-US" dirty="0"/>
+              <a:t>that </a:t>
+            </a:r>
+            <a:r>
+              <a:rPr lang="en-US" dirty="0" smtClean="0"/>
+              <a:t>			       generates </a:t>
+            </a:r>
+            <a:r>
+              <a:rPr lang="en-US" dirty="0"/>
+              <a:t>machine instructions for the printing </a:t>
+            </a:r>
+            <a:r>
+              <a:rPr lang="en-US" dirty="0" smtClean="0"/>
+              <a:t>hardware</a:t>
+            </a:r>
+            <a:r>
+              <a:rPr lang="en-US" dirty="0"/>
+              <a:t>.  The manual </a:t>
+            </a:r>
+            <a:r>
+              <a:rPr lang="en-US" dirty="0" smtClean="0"/>
+              <a:t>			       must </a:t>
+            </a:r>
+            <a:r>
+              <a:rPr lang="en-US" dirty="0"/>
+              <a:t>detail common troubleshooting issues as </a:t>
+            </a:r>
+            <a:r>
+              <a:rPr lang="en-US" dirty="0" smtClean="0"/>
+              <a:t>well </a:t>
+            </a:r>
+            <a:r>
+              <a:rPr lang="en-US" dirty="0"/>
+              <a:t>as provide basic usage </a:t>
+            </a:r>
+            <a:r>
+              <a:rPr lang="en-US" dirty="0" smtClean="0"/>
+              <a:t>			       instructions</a:t>
+            </a:r>
+            <a:r>
+              <a:rPr lang="en-US" dirty="0"/>
+              <a:t>.</a:t>
+            </a:r>
+          </a:p>
+          <a:p>
+            <a:pPr lvl="1"/>
+            <a:r>
+              <a:rPr lang="en-US" b="1" dirty="0" smtClean="0"/>
+              <a:t>7.1.2</a:t>
+            </a:r>
+            <a:r>
+              <a:rPr lang="en-US" b="1" dirty="0"/>
+              <a:t>	Source:</a:t>
             </a:r>
             <a:r>
               <a:rPr lang="en-US" dirty="0"/>
@@ -6150,13 +6217,14 @@
             </a:r>
           </a:p>
           <a:p>
-            <a:r>
-              <a:rPr lang="en-US" dirty="0"/>
-              <a:t>	</a:t>
-            </a:r>
-            <a:r>
-              <a:rPr lang="en-US" b="1" dirty="0"/>
-              <a:t>7.1.3	Constraints:</a:t>
+            <a:pPr lvl="1"/>
+            <a:r>
+              <a:rPr lang="en-US" b="1" dirty="0" smtClean="0"/>
+              <a:t>7.1.3</a:t>
+            </a:r>
+            <a:r>
+              <a:rPr lang="en-US" b="1" dirty="0"/>
+              <a:t>	Constraints:</a:t>
             </a:r>
             <a:r>
               <a:rPr lang="en-US" dirty="0"/>
@@ -6164,13 +6232,14 @@
             </a:r>
           </a:p>
           <a:p>
-            <a:r>
-              <a:rPr lang="en-US" dirty="0"/>
-              <a:t>	</a:t>
-            </a:r>
-            <a:r>
-              <a:rPr lang="en-US" b="1" dirty="0"/>
-              <a:t>7.1.4 	Standards:</a:t>
+            <a:pPr lvl="1"/>
+            <a:r>
+              <a:rPr lang="en-US" b="1" dirty="0" smtClean="0"/>
+              <a:t>7.1.4 </a:t>
+            </a:r>
+            <a:r>
+              <a:rPr lang="en-US" b="1" dirty="0"/>
+              <a:t>	Standards:</a:t>
             </a:r>
             <a:r>
               <a:rPr lang="en-US" dirty="0"/>
@@ -6178,13 +6247,14 @@
             </a:r>
           </a:p>
           <a:p>
-            <a:r>
-              <a:rPr lang="en-US" dirty="0"/>
-              <a:t>	</a:t>
-            </a:r>
-            <a:r>
-              <a:rPr lang="en-US" b="1" dirty="0"/>
-              <a:t>7.1.5	Priority:</a:t>
+            <a:pPr lvl="1"/>
+            <a:r>
+              <a:rPr lang="en-US" b="1" dirty="0" smtClean="0"/>
+              <a:t>7.1.5</a:t>
+            </a:r>
+            <a:r>
+              <a:rPr lang="en-US" b="1" dirty="0"/>
+              <a:t>	Priority:</a:t>
             </a:r>
             <a:r>
               <a:rPr lang="en-US" dirty="0"/>
@@ -6198,23 +6268,53 @@
             </a:r>
           </a:p>
           <a:p>
-            <a:r>
-              <a:rPr lang="en-US" b="1" dirty="0"/>
-              <a:t>	7.2.1	Description</a:t>
-            </a:r>
-            <a:r>
-              <a:rPr lang="en-US" dirty="0"/>
-              <a:t>:  The source code developed by the software team shall be well documented with comments explaining the functionality of all modules and any non-obvious code.  This documentation is intended to support any future development on the system.</a:t>
-            </a:r>
-          </a:p>
-          <a:p>
-            <a:r>
-              <a:rPr lang="en-US" dirty="0"/>
-              <a:t>	</a:t>
-            </a:r>
-            <a:r>
-              <a:rPr lang="en-US" b="1" dirty="0"/>
-              <a:t>7.2.2	Source:</a:t>
+            <a:pPr lvl="1"/>
+            <a:r>
+              <a:rPr lang="en-US" b="1" dirty="0" smtClean="0"/>
+              <a:t>7.2.1</a:t>
+            </a:r>
+            <a:r>
+              <a:rPr lang="en-US" b="1" dirty="0"/>
+              <a:t>	Description</a:t>
+            </a:r>
+            <a:r>
+              <a:rPr lang="en-US" dirty="0"/>
+              <a:t>:  The source code developed by the software team shall be well documented </a:t>
+            </a:r>
+            <a:r>
+              <a:rPr lang="en-US" dirty="0" smtClean="0"/>
+              <a:t>			       with </a:t>
+            </a:r>
+            <a:r>
+              <a:rPr lang="en-US" dirty="0"/>
+              <a:t>comments explaining the functionality of all modules and any </a:t>
+            </a:r>
+            <a:r>
+              <a:rPr lang="en-US" dirty="0" smtClean="0"/>
+              <a:t>non-			       obvious </a:t>
+            </a:r>
+            <a:r>
+              <a:rPr lang="en-US" dirty="0"/>
+              <a:t>code.  This documentation is intended to support any future </a:t>
+            </a:r>
+            <a:r>
+              <a:rPr lang="en-US" dirty="0" smtClean="0"/>
+              <a:t>				      development </a:t>
+            </a:r>
+            <a:r>
+              <a:rPr lang="en-US" dirty="0"/>
+              <a:t>on the system.</a:t>
+            </a:r>
+          </a:p>
+          <a:p>
+            <a:pPr lvl="1"/>
+            <a:r>
+              <a:rPr lang="en-US" b="1" dirty="0" smtClean="0"/>
+              <a:t>7.2.2</a:t>
+            </a:r>
+            <a:r>
+              <a:rPr lang="en-US" b="1" dirty="0"/>
+              <a:t>	Source:</a:t>
             </a:r>
             <a:r>
               <a:rPr lang="en-US" dirty="0"/>
@@ -6222,13 +6322,14 @@
             </a:r>
           </a:p>
           <a:p>
-            <a:r>
-              <a:rPr lang="en-US" dirty="0"/>
-              <a:t>	</a:t>
-            </a:r>
-            <a:r>
-              <a:rPr lang="en-US" b="1" dirty="0"/>
-              <a:t>7.2.3	Constraints:</a:t>
+            <a:pPr lvl="1"/>
+            <a:r>
+              <a:rPr lang="en-US" b="1" dirty="0" smtClean="0"/>
+              <a:t>7.2.3</a:t>
+            </a:r>
+            <a:r>
+              <a:rPr lang="en-US" b="1" dirty="0"/>
+              <a:t>	Constraints:</a:t>
             </a:r>
             <a:r>
               <a:rPr lang="en-US" dirty="0"/>
@@ -6236,13 +6337,14 @@
             </a:r>
           </a:p>
           <a:p>
-            <a:r>
-              <a:rPr lang="en-US" dirty="0"/>
-              <a:t>	</a:t>
-            </a:r>
-            <a:r>
-              <a:rPr lang="en-US" b="1" dirty="0"/>
-              <a:t>7.2.4 	Standards:</a:t>
+            <a:pPr lvl="1"/>
+            <a:r>
+              <a:rPr lang="en-US" b="1" dirty="0" smtClean="0"/>
+              <a:t>7.2.4 </a:t>
+            </a:r>
+            <a:r>
+              <a:rPr lang="en-US" b="1" dirty="0"/>
+              <a:t>	Standards:</a:t>
             </a:r>
             <a:r>
               <a:rPr lang="en-US" dirty="0"/>
@@ -6250,13 +6352,14 @@
             </a:r>
           </a:p>
           <a:p>
-            <a:r>
-              <a:rPr lang="en-US" dirty="0"/>
-              <a:t>	</a:t>
-            </a:r>
-            <a:r>
-              <a:rPr lang="en-US" b="1" dirty="0"/>
-              <a:t>7.2.5	Priority:</a:t>
+            <a:pPr lvl="1"/>
+            <a:r>
+              <a:rPr lang="en-US" b="1" dirty="0" smtClean="0"/>
+              <a:t>7.2.5</a:t>
+            </a:r>
+            <a:r>
+              <a:rPr lang="en-US" b="1" dirty="0"/>
+              <a:t>	Priority:</a:t>
             </a:r>
             <a:r>
               <a:rPr lang="en-US" dirty="0"/>
@@ -6279,6 +6382,1250 @@
 </file>
 
 <file path=ppt/slides/slide21.xml><?xml version="1.0" encoding="utf-8"?>
+<p:sld xmlns:a="http://schemas.openxmlformats.org/drawingml/2006/main" xmlns:r="http://schemas.openxmlformats.org/officeDocument/2006/relationships" xmlns:p="http://schemas.openxmlformats.org/presentationml/2006/main">
+  <p:cSld>
+    <p:spTree>
+      <p:nvGrpSpPr>
+        <p:cNvPr id="1" name=""/>
+        <p:cNvGrpSpPr/>
+        <p:nvPr/>
+      </p:nvGrpSpPr>
+      <p:grpSpPr>
+        <a:xfrm>
+          <a:off x="0" y="0"/>
+          <a:ext cx="0" cy="0"/>
+          <a:chOff x="0" y="0"/>
+          <a:chExt cx="0" cy="0"/>
+        </a:xfrm>
+      </p:grpSpPr>
+      <p:sp>
+        <p:nvSpPr>
+          <p:cNvPr id="2" name="Title 1"/>
+          <p:cNvSpPr>
+            <a:spLocks noGrp="1"/>
+          </p:cNvSpPr>
+          <p:nvPr>
+            <p:ph type="title"/>
+          </p:nvPr>
+        </p:nvSpPr>
+        <p:spPr>
+          <a:xfrm>
+            <a:off x="130628" y="274638"/>
+            <a:ext cx="11462657" cy="1143000"/>
+          </a:xfrm>
+        </p:spPr>
+        <p:txBody>
+          <a:bodyPr/>
+          <a:lstStyle/>
+          <a:p>
+            <a:r>
+              <a:rPr lang="en-US" sz="4500" dirty="0" smtClean="0"/>
+              <a:t>Other Requirements: Maintenance and Support</a:t>
+            </a:r>
+            <a:endParaRPr lang="en-US" sz="4500" dirty="0"/>
+          </a:p>
+        </p:txBody>
+      </p:sp>
+      <p:sp>
+        <p:nvSpPr>
+          <p:cNvPr id="3" name="Content Placeholder 2"/>
+          <p:cNvSpPr>
+            <a:spLocks noGrp="1"/>
+          </p:cNvSpPr>
+          <p:nvPr>
+            <p:ph idx="1"/>
+          </p:nvPr>
+        </p:nvSpPr>
+        <p:spPr>
+          <a:xfrm>
+            <a:off x="609599" y="1284514"/>
+            <a:ext cx="10765971" cy="5334000"/>
+          </a:xfrm>
+        </p:spPr>
+        <p:txBody>
+          <a:bodyPr>
+            <a:normAutofit/>
+          </a:bodyPr>
+          <a:lstStyle/>
+          <a:p>
+            <a:r>
+              <a:rPr lang="en-US" b="1" dirty="0"/>
+              <a:t>7.3	 Source Code Availability</a:t>
+            </a:r>
+          </a:p>
+          <a:p>
+            <a:pPr lvl="1"/>
+            <a:r>
+              <a:rPr lang="en-US" b="1" dirty="0" smtClean="0"/>
+              <a:t>7.3.1</a:t>
+            </a:r>
+            <a:r>
+              <a:rPr lang="en-US" b="1" dirty="0"/>
+              <a:t>	Description</a:t>
+            </a:r>
+            <a:r>
+              <a:rPr lang="en-US" dirty="0"/>
+              <a:t>:  The source code developed by the software team shall be freely </a:t>
+            </a:r>
+            <a:r>
+              <a:rPr lang="en-US" dirty="0" smtClean="0"/>
+              <a:t>				         available </a:t>
+            </a:r>
+            <a:r>
+              <a:rPr lang="en-US" dirty="0"/>
+              <a:t>to developers and the public. The source code will be hosted </a:t>
+            </a:r>
+            <a:r>
+              <a:rPr lang="en-US" dirty="0" smtClean="0"/>
+              <a:t>			         on </a:t>
+            </a:r>
+            <a:r>
+              <a:rPr lang="en-US" dirty="0"/>
+              <a:t>a public repository.</a:t>
+            </a:r>
+          </a:p>
+          <a:p>
+            <a:pPr lvl="1"/>
+            <a:r>
+              <a:rPr lang="en-US" b="1" dirty="0" smtClean="0"/>
+              <a:t>7.3.2</a:t>
+            </a:r>
+            <a:r>
+              <a:rPr lang="en-US" b="1" dirty="0"/>
+              <a:t>	Source:</a:t>
+            </a:r>
+            <a:r>
+              <a:rPr lang="en-US" dirty="0"/>
+              <a:t>  Shawn Simonson (Team Members)</a:t>
+            </a:r>
+          </a:p>
+          <a:p>
+            <a:pPr lvl="1"/>
+            <a:r>
+              <a:rPr lang="en-US" b="1" dirty="0" smtClean="0"/>
+              <a:t>7.3.3</a:t>
+            </a:r>
+            <a:r>
+              <a:rPr lang="en-US" b="1" dirty="0"/>
+              <a:t>	Constraints:</a:t>
+            </a:r>
+            <a:r>
+              <a:rPr lang="en-US" dirty="0"/>
+              <a:t>  None</a:t>
+            </a:r>
+          </a:p>
+          <a:p>
+            <a:pPr lvl="1"/>
+            <a:r>
+              <a:rPr lang="en-US" b="1" dirty="0" smtClean="0"/>
+              <a:t>7.3.4 </a:t>
+            </a:r>
+            <a:r>
+              <a:rPr lang="en-US" b="1" dirty="0"/>
+              <a:t>	Standards:</a:t>
+            </a:r>
+            <a:r>
+              <a:rPr lang="en-US" dirty="0"/>
+              <a:t>  </a:t>
+            </a:r>
+            <a:r>
+              <a:rPr lang="en-US" dirty="0" err="1"/>
+              <a:t>Git</a:t>
+            </a:r>
+            <a:r>
+              <a:rPr lang="en-US" dirty="0"/>
+              <a:t>, SVN</a:t>
+            </a:r>
+          </a:p>
+          <a:p>
+            <a:pPr lvl="1"/>
+            <a:r>
+              <a:rPr lang="en-US" b="1" dirty="0" smtClean="0"/>
+              <a:t>7.3.5</a:t>
+            </a:r>
+            <a:r>
+              <a:rPr lang="en-US" b="1" dirty="0"/>
+              <a:t>	Priority:</a:t>
+            </a:r>
+            <a:r>
+              <a:rPr lang="en-US" dirty="0"/>
+              <a:t>  2 – </a:t>
+            </a:r>
+            <a:r>
+              <a:rPr lang="en-US" dirty="0" smtClean="0"/>
+              <a:t>High</a:t>
+            </a:r>
+          </a:p>
+          <a:p>
+            <a:pPr lvl="1"/>
+            <a:endParaRPr lang="en-US" dirty="0"/>
+          </a:p>
+        </p:txBody>
+      </p:sp>
+    </p:spTree>
+    <p:extLst>
+      <p:ext uri="{BB962C8B-B14F-4D97-AF65-F5344CB8AC3E}">
+        <p14:creationId xmlns:p14="http://schemas.microsoft.com/office/powerpoint/2010/main" val="2180922343"/>
+      </p:ext>
+    </p:extLst>
+  </p:cSld>
+  <p:clrMapOvr>
+    <a:masterClrMapping/>
+  </p:clrMapOvr>
+</p:sld>
+</file>
+
+<file path=ppt/slides/slide22.xml><?xml version="1.0" encoding="utf-8"?>
+<p:sld xmlns:a="http://schemas.openxmlformats.org/drawingml/2006/main" xmlns:r="http://schemas.openxmlformats.org/officeDocument/2006/relationships" xmlns:p="http://schemas.openxmlformats.org/presentationml/2006/main">
+  <p:cSld>
+    <p:spTree>
+      <p:nvGrpSpPr>
+        <p:cNvPr id="1" name=""/>
+        <p:cNvGrpSpPr/>
+        <p:nvPr/>
+      </p:nvGrpSpPr>
+      <p:grpSpPr>
+        <a:xfrm>
+          <a:off x="0" y="0"/>
+          <a:ext cx="0" cy="0"/>
+          <a:chOff x="0" y="0"/>
+          <a:chExt cx="0" cy="0"/>
+        </a:xfrm>
+      </p:grpSpPr>
+      <p:sp>
+        <p:nvSpPr>
+          <p:cNvPr id="2" name="Title 1"/>
+          <p:cNvSpPr>
+            <a:spLocks noGrp="1"/>
+          </p:cNvSpPr>
+          <p:nvPr>
+            <p:ph type="title"/>
+          </p:nvPr>
+        </p:nvSpPr>
+        <p:spPr>
+          <a:xfrm>
+            <a:off x="130628" y="274638"/>
+            <a:ext cx="11462657" cy="1143000"/>
+          </a:xfrm>
+        </p:spPr>
+        <p:txBody>
+          <a:bodyPr/>
+          <a:lstStyle/>
+          <a:p>
+            <a:r>
+              <a:rPr lang="en-US" sz="4500" dirty="0" smtClean="0"/>
+              <a:t>Other Requirements: </a:t>
+            </a:r>
+            <a:r>
+              <a:rPr lang="en-US" sz="4500" dirty="0" smtClean="0"/>
+              <a:t>Additional</a:t>
+            </a:r>
+            <a:endParaRPr lang="en-US" sz="4500" dirty="0"/>
+          </a:p>
+        </p:txBody>
+      </p:sp>
+      <p:sp>
+        <p:nvSpPr>
+          <p:cNvPr id="3" name="Content Placeholder 2"/>
+          <p:cNvSpPr>
+            <a:spLocks noGrp="1"/>
+          </p:cNvSpPr>
+          <p:nvPr>
+            <p:ph idx="1"/>
+          </p:nvPr>
+        </p:nvSpPr>
+        <p:spPr>
+          <a:xfrm>
+            <a:off x="609599" y="1284514"/>
+            <a:ext cx="10765971" cy="5334000"/>
+          </a:xfrm>
+        </p:spPr>
+        <p:txBody>
+          <a:bodyPr>
+            <a:normAutofit lnSpcReduction="10000"/>
+          </a:bodyPr>
+          <a:lstStyle/>
+          <a:p>
+            <a:r>
+              <a:rPr lang="en-US" b="1" dirty="0"/>
+              <a:t>8.1	Material Database</a:t>
+            </a:r>
+          </a:p>
+          <a:p>
+            <a:pPr lvl="1"/>
+            <a:r>
+              <a:rPr lang="en-US" b="1" dirty="0" smtClean="0"/>
+              <a:t>8.1.1</a:t>
+            </a:r>
+            <a:r>
+              <a:rPr lang="en-US" b="1" dirty="0"/>
+              <a:t>	Description</a:t>
+            </a:r>
+            <a:r>
+              <a:rPr lang="en-US" dirty="0"/>
+              <a:t>:  The system shall have a database that holds information about how the </a:t>
+            </a:r>
+            <a:r>
+              <a:rPr lang="en-US" dirty="0" smtClean="0"/>
+              <a:t>			         material </a:t>
+            </a:r>
+            <a:r>
+              <a:rPr lang="en-US" dirty="0"/>
+              <a:t>is printed.  For each material, the database must hold the </a:t>
+            </a:r>
+            <a:r>
+              <a:rPr lang="en-US" dirty="0" smtClean="0"/>
+              <a:t>			         diameter </a:t>
+            </a:r>
+            <a:r>
+              <a:rPr lang="en-US" dirty="0"/>
+              <a:t>of the material filament and the temperature the filament </a:t>
+            </a:r>
+            <a:r>
+              <a:rPr lang="en-US" dirty="0" smtClean="0"/>
+              <a:t>			         must </a:t>
+            </a:r>
+            <a:r>
+              <a:rPr lang="en-US" dirty="0"/>
+              <a:t>be extruded at.</a:t>
+            </a:r>
+          </a:p>
+          <a:p>
+            <a:pPr lvl="1"/>
+            <a:r>
+              <a:rPr lang="en-US" b="1" dirty="0" smtClean="0"/>
+              <a:t>8.1.2</a:t>
+            </a:r>
+            <a:r>
+              <a:rPr lang="en-US" b="1" dirty="0"/>
+              <a:t>	Source:</a:t>
+            </a:r>
+            <a:r>
+              <a:rPr lang="en-US" dirty="0"/>
+              <a:t>  Dr. </a:t>
+            </a:r>
+            <a:r>
+              <a:rPr lang="en-US" dirty="0" err="1"/>
+              <a:t>Panos</a:t>
+            </a:r>
+            <a:r>
+              <a:rPr lang="en-US" dirty="0"/>
+              <a:t> S. </a:t>
+            </a:r>
+            <a:r>
+              <a:rPr lang="en-US" dirty="0" err="1"/>
+              <a:t>Shiakolas</a:t>
+            </a:r>
+            <a:r>
+              <a:rPr lang="en-US" dirty="0"/>
+              <a:t> (Sponsor)</a:t>
+            </a:r>
+          </a:p>
+          <a:p>
+            <a:pPr lvl="1"/>
+            <a:r>
+              <a:rPr lang="en-US" b="1" dirty="0" smtClean="0"/>
+              <a:t>8.1.3 	Constraints</a:t>
+            </a:r>
+            <a:r>
+              <a:rPr lang="en-US" b="1" dirty="0"/>
+              <a:t>:</a:t>
+            </a:r>
+            <a:r>
+              <a:rPr lang="en-US" dirty="0"/>
+              <a:t>  None</a:t>
+            </a:r>
+          </a:p>
+          <a:p>
+            <a:pPr lvl="1"/>
+            <a:r>
+              <a:rPr lang="en-US" b="1" dirty="0" smtClean="0"/>
+              <a:t>8.1.4	Standards</a:t>
+            </a:r>
+            <a:r>
+              <a:rPr lang="en-US" b="1" dirty="0"/>
+              <a:t>:</a:t>
+            </a:r>
+            <a:r>
+              <a:rPr lang="en-US" dirty="0"/>
+              <a:t>  Binary Text</a:t>
+            </a:r>
+          </a:p>
+          <a:p>
+            <a:pPr lvl="1"/>
+            <a:r>
+              <a:rPr lang="en-US" b="1" dirty="0" smtClean="0"/>
+              <a:t>8.1.5</a:t>
+            </a:r>
+            <a:r>
+              <a:rPr lang="en-US" b="1" dirty="0"/>
+              <a:t>	Priority:</a:t>
+            </a:r>
+            <a:r>
+              <a:rPr lang="en-US" dirty="0"/>
+              <a:t>  1 – Critical</a:t>
+            </a:r>
+          </a:p>
+          <a:p>
+            <a:r>
+              <a:rPr lang="en-US" b="1" dirty="0"/>
+              <a:t>8.2	Abstract Hardware Interface</a:t>
+            </a:r>
+          </a:p>
+          <a:p>
+            <a:pPr lvl="1"/>
+            <a:r>
+              <a:rPr lang="en-US" b="1" dirty="0" smtClean="0"/>
+              <a:t>8.2.1</a:t>
+            </a:r>
+            <a:r>
+              <a:rPr lang="en-US" b="1" dirty="0"/>
+              <a:t>	Description:</a:t>
+            </a:r>
+            <a:r>
+              <a:rPr lang="en-US" dirty="0"/>
+              <a:t> The system shall allow for multiple different printers and multiple </a:t>
+            </a:r>
+            <a:r>
+              <a:rPr lang="en-US" dirty="0" smtClean="0"/>
+              <a:t>				        different </a:t>
+            </a:r>
+            <a:r>
+              <a:rPr lang="en-US" dirty="0"/>
+              <a:t>heads to be used with minimal software change.</a:t>
+            </a:r>
+          </a:p>
+          <a:p>
+            <a:pPr lvl="1"/>
+            <a:r>
+              <a:rPr lang="en-US" b="1" dirty="0" smtClean="0"/>
+              <a:t>8.2.2</a:t>
+            </a:r>
+            <a:r>
+              <a:rPr lang="en-US" b="1" dirty="0"/>
+              <a:t>	Source:</a:t>
+            </a:r>
+            <a:r>
+              <a:rPr lang="en-US" dirty="0"/>
+              <a:t>  Jesse Bowles (Team Member)</a:t>
+            </a:r>
+          </a:p>
+          <a:p>
+            <a:pPr lvl="1"/>
+            <a:r>
+              <a:rPr lang="en-US" b="1" dirty="0" smtClean="0"/>
+              <a:t>8.2.3 	Constraints</a:t>
+            </a:r>
+            <a:r>
+              <a:rPr lang="en-US" b="1" dirty="0"/>
+              <a:t>:</a:t>
+            </a:r>
+            <a:r>
+              <a:rPr lang="en-US" dirty="0"/>
+              <a:t>  Unknown hardware interface </a:t>
+            </a:r>
+          </a:p>
+          <a:p>
+            <a:pPr lvl="1"/>
+            <a:r>
+              <a:rPr lang="en-US" b="1" dirty="0" smtClean="0"/>
+              <a:t>8.2.4 	Standards</a:t>
+            </a:r>
+            <a:r>
+              <a:rPr lang="en-US" b="1" dirty="0"/>
+              <a:t>:</a:t>
+            </a:r>
+            <a:r>
+              <a:rPr lang="en-US" dirty="0"/>
+              <a:t>  None</a:t>
+            </a:r>
+          </a:p>
+          <a:p>
+            <a:pPr lvl="1"/>
+            <a:r>
+              <a:rPr lang="en-US" b="1" dirty="0" smtClean="0"/>
+              <a:t>8.2.5</a:t>
+            </a:r>
+            <a:r>
+              <a:rPr lang="en-US" b="1" dirty="0"/>
+              <a:t>	Priority:</a:t>
+            </a:r>
+            <a:r>
+              <a:rPr lang="en-US" dirty="0"/>
+              <a:t>  1 – Critical</a:t>
+            </a:r>
+          </a:p>
+          <a:p>
+            <a:pPr lvl="1"/>
+            <a:endParaRPr lang="en-US" dirty="0"/>
+          </a:p>
+        </p:txBody>
+      </p:sp>
+    </p:spTree>
+    <p:extLst>
+      <p:ext uri="{BB962C8B-B14F-4D97-AF65-F5344CB8AC3E}">
+        <p14:creationId xmlns:p14="http://schemas.microsoft.com/office/powerpoint/2010/main" val="3885607426"/>
+      </p:ext>
+    </p:extLst>
+  </p:cSld>
+  <p:clrMapOvr>
+    <a:masterClrMapping/>
+  </p:clrMapOvr>
+</p:sld>
+</file>
+
+<file path=ppt/slides/slide23.xml><?xml version="1.0" encoding="utf-8"?>
+<p:sld xmlns:a="http://schemas.openxmlformats.org/drawingml/2006/main" xmlns:r="http://schemas.openxmlformats.org/officeDocument/2006/relationships" xmlns:p="http://schemas.openxmlformats.org/presentationml/2006/main">
+  <p:cSld>
+    <p:spTree>
+      <p:nvGrpSpPr>
+        <p:cNvPr id="1" name=""/>
+        <p:cNvGrpSpPr/>
+        <p:nvPr/>
+      </p:nvGrpSpPr>
+      <p:grpSpPr>
+        <a:xfrm>
+          <a:off x="0" y="0"/>
+          <a:ext cx="0" cy="0"/>
+          <a:chOff x="0" y="0"/>
+          <a:chExt cx="0" cy="0"/>
+        </a:xfrm>
+      </p:grpSpPr>
+      <p:sp>
+        <p:nvSpPr>
+          <p:cNvPr id="2" name="Title 1"/>
+          <p:cNvSpPr>
+            <a:spLocks noGrp="1"/>
+          </p:cNvSpPr>
+          <p:nvPr>
+            <p:ph type="title"/>
+          </p:nvPr>
+        </p:nvSpPr>
+        <p:spPr>
+          <a:xfrm>
+            <a:off x="130628" y="274638"/>
+            <a:ext cx="11462657" cy="1143000"/>
+          </a:xfrm>
+        </p:spPr>
+        <p:txBody>
+          <a:bodyPr/>
+          <a:lstStyle/>
+          <a:p>
+            <a:r>
+              <a:rPr lang="en-US" sz="4500" dirty="0" smtClean="0"/>
+              <a:t>Other Requirements: </a:t>
+            </a:r>
+            <a:r>
+              <a:rPr lang="en-US" sz="4500" dirty="0" smtClean="0"/>
+              <a:t>Additional</a:t>
+            </a:r>
+            <a:endParaRPr lang="en-US" sz="4500" dirty="0"/>
+          </a:p>
+        </p:txBody>
+      </p:sp>
+      <p:sp>
+        <p:nvSpPr>
+          <p:cNvPr id="3" name="Content Placeholder 2"/>
+          <p:cNvSpPr>
+            <a:spLocks noGrp="1"/>
+          </p:cNvSpPr>
+          <p:nvPr>
+            <p:ph idx="1"/>
+          </p:nvPr>
+        </p:nvSpPr>
+        <p:spPr>
+          <a:xfrm>
+            <a:off x="609599" y="1284514"/>
+            <a:ext cx="10765971" cy="5334000"/>
+          </a:xfrm>
+        </p:spPr>
+        <p:txBody>
+          <a:bodyPr>
+            <a:normAutofit/>
+          </a:bodyPr>
+          <a:lstStyle/>
+          <a:p>
+            <a:r>
+              <a:rPr lang="en-US" b="1" dirty="0"/>
+              <a:t>8.3	Modular and Scalable Design</a:t>
+            </a:r>
+          </a:p>
+          <a:p>
+            <a:pPr lvl="1"/>
+            <a:r>
+              <a:rPr lang="en-US" b="1" dirty="0" smtClean="0"/>
+              <a:t>8.3.1</a:t>
+            </a:r>
+            <a:r>
+              <a:rPr lang="en-US" b="1" dirty="0"/>
+              <a:t>	Description:</a:t>
+            </a:r>
+            <a:r>
+              <a:rPr lang="en-US" dirty="0"/>
+              <a:t> The software shall be developed using proven design principles to </a:t>
+            </a:r>
+            <a:r>
+              <a:rPr lang="en-US" dirty="0" smtClean="0"/>
+              <a:t>				        ensure </a:t>
+            </a:r>
+            <a:r>
+              <a:rPr lang="en-US" dirty="0"/>
+              <a:t>that it can be scaled and maintained by future development </a:t>
+            </a:r>
+            <a:r>
+              <a:rPr lang="en-US" dirty="0" smtClean="0"/>
+              <a:t>			        teams</a:t>
+            </a:r>
+            <a:r>
+              <a:rPr lang="en-US" dirty="0"/>
+              <a:t>.</a:t>
+            </a:r>
+          </a:p>
+          <a:p>
+            <a:pPr lvl="1"/>
+            <a:r>
+              <a:rPr lang="en-US" b="1" dirty="0" smtClean="0"/>
+              <a:t>8.3.2</a:t>
+            </a:r>
+            <a:r>
+              <a:rPr lang="en-US" b="1" dirty="0"/>
+              <a:t>	Source:</a:t>
+            </a:r>
+            <a:r>
+              <a:rPr lang="en-US" dirty="0"/>
+              <a:t>  Dr. </a:t>
+            </a:r>
+            <a:r>
+              <a:rPr lang="en-US" dirty="0" err="1"/>
+              <a:t>Panos</a:t>
+            </a:r>
+            <a:r>
+              <a:rPr lang="en-US" dirty="0"/>
+              <a:t> S. </a:t>
+            </a:r>
+            <a:r>
+              <a:rPr lang="en-US" dirty="0" err="1"/>
+              <a:t>Shiakolas</a:t>
+            </a:r>
+            <a:r>
+              <a:rPr lang="en-US" dirty="0"/>
+              <a:t> (Sponsor)</a:t>
+            </a:r>
+          </a:p>
+          <a:p>
+            <a:pPr lvl="1"/>
+            <a:r>
+              <a:rPr lang="en-US" b="1" dirty="0" smtClean="0"/>
+              <a:t>8.3.3 	Constraints</a:t>
+            </a:r>
+            <a:r>
+              <a:rPr lang="en-US" b="1" dirty="0"/>
+              <a:t>:</a:t>
+            </a:r>
+            <a:r>
+              <a:rPr lang="en-US" dirty="0"/>
+              <a:t>  None</a:t>
+            </a:r>
+          </a:p>
+          <a:p>
+            <a:pPr lvl="1"/>
+            <a:r>
+              <a:rPr lang="en-US" b="1" dirty="0" smtClean="0"/>
+              <a:t>8.3.4 	Standards</a:t>
+            </a:r>
+            <a:r>
+              <a:rPr lang="en-US" b="1" dirty="0"/>
+              <a:t>:</a:t>
+            </a:r>
+            <a:r>
+              <a:rPr lang="en-US" dirty="0"/>
+              <a:t>  S.O.L.I.D. Design Principles</a:t>
+            </a:r>
+          </a:p>
+          <a:p>
+            <a:pPr lvl="1"/>
+            <a:r>
+              <a:rPr lang="en-US" b="1" dirty="0" smtClean="0"/>
+              <a:t>8.3.5</a:t>
+            </a:r>
+            <a:r>
+              <a:rPr lang="en-US" b="1" dirty="0"/>
+              <a:t>	Priority:</a:t>
+            </a:r>
+            <a:r>
+              <a:rPr lang="en-US" dirty="0"/>
+              <a:t>  1 – Critical</a:t>
+            </a:r>
+          </a:p>
+          <a:p>
+            <a:pPr lvl="1"/>
+            <a:endParaRPr lang="en-US" dirty="0"/>
+          </a:p>
+        </p:txBody>
+      </p:sp>
+    </p:spTree>
+    <p:extLst>
+      <p:ext uri="{BB962C8B-B14F-4D97-AF65-F5344CB8AC3E}">
+        <p14:creationId xmlns:p14="http://schemas.microsoft.com/office/powerpoint/2010/main" val="3191933334"/>
+      </p:ext>
+    </p:extLst>
+  </p:cSld>
+  <p:clrMapOvr>
+    <a:masterClrMapping/>
+  </p:clrMapOvr>
+</p:sld>
+</file>
+
+<file path=ppt/slides/slide24.xml><?xml version="1.0" encoding="utf-8"?>
+<p:sld xmlns:a="http://schemas.openxmlformats.org/drawingml/2006/main" xmlns:r="http://schemas.openxmlformats.org/officeDocument/2006/relationships" xmlns:p="http://schemas.openxmlformats.org/presentationml/2006/main">
+  <p:cSld>
+    <p:spTree>
+      <p:nvGrpSpPr>
+        <p:cNvPr id="1" name=""/>
+        <p:cNvGrpSpPr/>
+        <p:nvPr/>
+      </p:nvGrpSpPr>
+      <p:grpSpPr>
+        <a:xfrm>
+          <a:off x="0" y="0"/>
+          <a:ext cx="0" cy="0"/>
+          <a:chOff x="0" y="0"/>
+          <a:chExt cx="0" cy="0"/>
+        </a:xfrm>
+      </p:grpSpPr>
+      <p:sp>
+        <p:nvSpPr>
+          <p:cNvPr id="2" name="Title 1"/>
+          <p:cNvSpPr>
+            <a:spLocks noGrp="1"/>
+          </p:cNvSpPr>
+          <p:nvPr>
+            <p:ph type="title"/>
+          </p:nvPr>
+        </p:nvSpPr>
+        <p:spPr>
+          <a:xfrm>
+            <a:off x="130628" y="274638"/>
+            <a:ext cx="11462657" cy="1143000"/>
+          </a:xfrm>
+        </p:spPr>
+        <p:txBody>
+          <a:bodyPr/>
+          <a:lstStyle/>
+          <a:p>
+            <a:r>
+              <a:rPr lang="en-US" sz="4500" dirty="0" smtClean="0"/>
+              <a:t>Other Requirements: </a:t>
+            </a:r>
+            <a:r>
+              <a:rPr lang="en-US" sz="4500" dirty="0" smtClean="0"/>
+              <a:t>Acceptance Criteria</a:t>
+            </a:r>
+            <a:endParaRPr lang="en-US" sz="4500" dirty="0"/>
+          </a:p>
+        </p:txBody>
+      </p:sp>
+      <p:sp>
+        <p:nvSpPr>
+          <p:cNvPr id="3" name="Content Placeholder 2"/>
+          <p:cNvSpPr>
+            <a:spLocks noGrp="1"/>
+          </p:cNvSpPr>
+          <p:nvPr>
+            <p:ph idx="1"/>
+          </p:nvPr>
+        </p:nvSpPr>
+        <p:spPr>
+          <a:xfrm>
+            <a:off x="609599" y="1284514"/>
+            <a:ext cx="10765971" cy="5334000"/>
+          </a:xfrm>
+        </p:spPr>
+        <p:txBody>
+          <a:bodyPr>
+            <a:normAutofit/>
+          </a:bodyPr>
+          <a:lstStyle/>
+          <a:p>
+            <a:r>
+              <a:rPr lang="en-US" b="1" dirty="0"/>
+              <a:t>9.1	Verify that the system reads STL files</a:t>
+            </a:r>
+          </a:p>
+          <a:p>
+            <a:pPr lvl="1"/>
+            <a:r>
+              <a:rPr lang="en-US" b="1" dirty="0" smtClean="0"/>
+              <a:t>9.1.1</a:t>
+            </a:r>
+            <a:r>
+              <a:rPr lang="en-US" b="1" dirty="0"/>
+              <a:t>	Requirement(s) addressed:</a:t>
+            </a:r>
+            <a:r>
+              <a:rPr lang="en-US" dirty="0"/>
+              <a:t>  </a:t>
+            </a:r>
+            <a:endParaRPr lang="en-US" dirty="0" smtClean="0"/>
+          </a:p>
+          <a:p>
+            <a:pPr lvl="2"/>
+            <a:r>
+              <a:rPr lang="en-US" dirty="0" smtClean="0"/>
+              <a:t>3.1 </a:t>
+            </a:r>
+            <a:r>
+              <a:rPr lang="en-US" dirty="0"/>
+              <a:t>– STL File Input</a:t>
+            </a:r>
+          </a:p>
+          <a:p>
+            <a:pPr lvl="1"/>
+            <a:r>
+              <a:rPr lang="en-US" b="1" dirty="0" smtClean="0"/>
+              <a:t>9.1.2</a:t>
+            </a:r>
+            <a:r>
+              <a:rPr lang="en-US" b="1" dirty="0"/>
+              <a:t>	Verification Procedure:</a:t>
+            </a:r>
+            <a:r>
+              <a:rPr lang="en-US" dirty="0"/>
+              <a:t>  The user will be able to see the file has been accepted and </a:t>
+            </a:r>
+            <a:r>
+              <a:rPr lang="en-US" dirty="0" smtClean="0"/>
+              <a:t>				             the </a:t>
+            </a:r>
+            <a:r>
+              <a:rPr lang="en-US" dirty="0"/>
+              <a:t>file name will be displayed in the GUI.</a:t>
+            </a:r>
+          </a:p>
+          <a:p>
+            <a:r>
+              <a:rPr lang="en-US" b="1" dirty="0"/>
+              <a:t>9.2	Verify the database interface</a:t>
+            </a:r>
+          </a:p>
+          <a:p>
+            <a:pPr lvl="1"/>
+            <a:r>
+              <a:rPr lang="en-US" b="1" dirty="0" smtClean="0"/>
+              <a:t>9.2.1</a:t>
+            </a:r>
+            <a:r>
+              <a:rPr lang="en-US" b="1" dirty="0"/>
+              <a:t>	Requirement(s) addressed:</a:t>
+            </a:r>
+            <a:r>
+              <a:rPr lang="en-US" dirty="0"/>
+              <a:t> </a:t>
+            </a:r>
+            <a:endParaRPr lang="en-US" dirty="0" smtClean="0"/>
+          </a:p>
+          <a:p>
+            <a:pPr lvl="3"/>
+            <a:r>
+              <a:rPr lang="en-US" dirty="0" smtClean="0"/>
+              <a:t>3.2 </a:t>
+            </a:r>
+            <a:r>
+              <a:rPr lang="en-US" dirty="0"/>
+              <a:t>– Graphical User </a:t>
+            </a:r>
+            <a:r>
+              <a:rPr lang="en-US" dirty="0" smtClean="0"/>
+              <a:t>Interface</a:t>
+            </a:r>
+          </a:p>
+          <a:p>
+            <a:pPr lvl="3"/>
+            <a:r>
+              <a:rPr lang="en-US" dirty="0" smtClean="0"/>
+              <a:t>3.13 </a:t>
+            </a:r>
+            <a:r>
+              <a:rPr lang="en-US" dirty="0"/>
+              <a:t>– </a:t>
+            </a:r>
+            <a:r>
+              <a:rPr lang="en-US" dirty="0" smtClean="0"/>
+              <a:t>Database Interface</a:t>
+            </a:r>
+          </a:p>
+          <a:p>
+            <a:pPr lvl="3"/>
+            <a:r>
+              <a:rPr lang="en-US" dirty="0" smtClean="0"/>
+              <a:t>3.14 </a:t>
+            </a:r>
+            <a:r>
+              <a:rPr lang="en-US" dirty="0"/>
+              <a:t>– Store and Load Material </a:t>
+            </a:r>
+            <a:r>
+              <a:rPr lang="en-US" dirty="0" smtClean="0"/>
+              <a:t>Records</a:t>
+            </a:r>
+          </a:p>
+          <a:p>
+            <a:pPr lvl="3"/>
+            <a:r>
+              <a:rPr lang="en-US" dirty="0" smtClean="0"/>
+              <a:t>8.1 </a:t>
+            </a:r>
+            <a:r>
+              <a:rPr lang="en-US" dirty="0"/>
+              <a:t>– Material Database</a:t>
+            </a:r>
+          </a:p>
+          <a:p>
+            <a:pPr lvl="1"/>
+            <a:r>
+              <a:rPr lang="en-US" b="1" dirty="0" smtClean="0"/>
+              <a:t>9.2.2</a:t>
+            </a:r>
+            <a:r>
+              <a:rPr lang="en-US" b="1" dirty="0"/>
+              <a:t>	Verification Procedure:</a:t>
+            </a:r>
+            <a:r>
+              <a:rPr lang="en-US" dirty="0"/>
+              <a:t>  The user will load the GUI and click on the view/edit </a:t>
+            </a:r>
+            <a:r>
+              <a:rPr lang="en-US" dirty="0" smtClean="0"/>
+              <a:t>					             database </a:t>
+            </a:r>
+            <a:r>
+              <a:rPr lang="en-US" dirty="0"/>
+              <a:t>button.  The user then will see and be able to edit </a:t>
+            </a:r>
+            <a:r>
+              <a:rPr lang="en-US" dirty="0" smtClean="0"/>
+              <a:t>				             stored </a:t>
+            </a:r>
+            <a:r>
+              <a:rPr lang="en-US" dirty="0"/>
+              <a:t>values.   Upon changing values the user will return to </a:t>
+            </a:r>
+            <a:r>
+              <a:rPr lang="en-US" dirty="0" smtClean="0"/>
+              <a:t>				             the </a:t>
+            </a:r>
+            <a:r>
+              <a:rPr lang="en-US" dirty="0"/>
+              <a:t>main menu.  Clicking on the view/edit button again will </a:t>
+            </a:r>
+            <a:r>
+              <a:rPr lang="en-US" dirty="0" smtClean="0"/>
+              <a:t>				            display </a:t>
+            </a:r>
+            <a:r>
+              <a:rPr lang="en-US" dirty="0"/>
+              <a:t>the edited values.</a:t>
+            </a:r>
+          </a:p>
+          <a:p>
+            <a:pPr lvl="1"/>
+            <a:endParaRPr lang="en-US" dirty="0"/>
+          </a:p>
+        </p:txBody>
+      </p:sp>
+    </p:spTree>
+    <p:extLst>
+      <p:ext uri="{BB962C8B-B14F-4D97-AF65-F5344CB8AC3E}">
+        <p14:creationId xmlns:p14="http://schemas.microsoft.com/office/powerpoint/2010/main" val="2873829836"/>
+      </p:ext>
+    </p:extLst>
+  </p:cSld>
+  <p:clrMapOvr>
+    <a:masterClrMapping/>
+  </p:clrMapOvr>
+</p:sld>
+</file>
+
+<file path=ppt/slides/slide25.xml><?xml version="1.0" encoding="utf-8"?>
+<p:sld xmlns:a="http://schemas.openxmlformats.org/drawingml/2006/main" xmlns:r="http://schemas.openxmlformats.org/officeDocument/2006/relationships" xmlns:p="http://schemas.openxmlformats.org/presentationml/2006/main">
+  <p:cSld>
+    <p:spTree>
+      <p:nvGrpSpPr>
+        <p:cNvPr id="1" name=""/>
+        <p:cNvGrpSpPr/>
+        <p:nvPr/>
+      </p:nvGrpSpPr>
+      <p:grpSpPr>
+        <a:xfrm>
+          <a:off x="0" y="0"/>
+          <a:ext cx="0" cy="0"/>
+          <a:chOff x="0" y="0"/>
+          <a:chExt cx="0" cy="0"/>
+        </a:xfrm>
+      </p:grpSpPr>
+      <p:sp>
+        <p:nvSpPr>
+          <p:cNvPr id="2" name="Title 1"/>
+          <p:cNvSpPr>
+            <a:spLocks noGrp="1"/>
+          </p:cNvSpPr>
+          <p:nvPr>
+            <p:ph type="title"/>
+          </p:nvPr>
+        </p:nvSpPr>
+        <p:spPr>
+          <a:xfrm>
+            <a:off x="130628" y="274638"/>
+            <a:ext cx="11462657" cy="1143000"/>
+          </a:xfrm>
+        </p:spPr>
+        <p:txBody>
+          <a:bodyPr/>
+          <a:lstStyle/>
+          <a:p>
+            <a:r>
+              <a:rPr lang="en-US" sz="4500" dirty="0" smtClean="0"/>
+              <a:t>Other Requirements: </a:t>
+            </a:r>
+            <a:r>
+              <a:rPr lang="en-US" sz="4500" dirty="0" smtClean="0"/>
+              <a:t>Acceptance Criteria</a:t>
+            </a:r>
+            <a:endParaRPr lang="en-US" sz="4500" dirty="0"/>
+          </a:p>
+        </p:txBody>
+      </p:sp>
+      <p:sp>
+        <p:nvSpPr>
+          <p:cNvPr id="3" name="Content Placeholder 2"/>
+          <p:cNvSpPr>
+            <a:spLocks noGrp="1"/>
+          </p:cNvSpPr>
+          <p:nvPr>
+            <p:ph idx="1"/>
+          </p:nvPr>
+        </p:nvSpPr>
+        <p:spPr>
+          <a:xfrm>
+            <a:off x="609599" y="1284514"/>
+            <a:ext cx="10765971" cy="5334000"/>
+          </a:xfrm>
+        </p:spPr>
+        <p:txBody>
+          <a:bodyPr>
+            <a:normAutofit fontScale="92500" lnSpcReduction="10000"/>
+          </a:bodyPr>
+          <a:lstStyle/>
+          <a:p>
+            <a:r>
+              <a:rPr lang="en-US" b="1" dirty="0"/>
+              <a:t>9.3	Verify the system prints a model</a:t>
+            </a:r>
+          </a:p>
+          <a:p>
+            <a:pPr lvl="1"/>
+            <a:r>
+              <a:rPr lang="en-US" b="1" dirty="0" smtClean="0"/>
+              <a:t>9.3.1</a:t>
+            </a:r>
+            <a:r>
+              <a:rPr lang="en-US" b="1" dirty="0"/>
+              <a:t>	Requirement(s) addressed:</a:t>
+            </a:r>
+            <a:r>
+              <a:rPr lang="en-US" dirty="0"/>
+              <a:t>  </a:t>
+            </a:r>
+            <a:endParaRPr lang="en-US" dirty="0" smtClean="0"/>
+          </a:p>
+          <a:p>
+            <a:pPr lvl="2"/>
+            <a:r>
+              <a:rPr lang="en-US" dirty="0" smtClean="0"/>
+              <a:t>3.1 </a:t>
+            </a:r>
+            <a:r>
+              <a:rPr lang="en-US" dirty="0"/>
+              <a:t>– STL File </a:t>
+            </a:r>
+            <a:r>
+              <a:rPr lang="en-US" dirty="0" smtClean="0"/>
+              <a:t>Input					3.3 </a:t>
+            </a:r>
+            <a:r>
+              <a:rPr lang="en-US" dirty="0"/>
+              <a:t>– Generate Machine </a:t>
+            </a:r>
+            <a:r>
+              <a:rPr lang="en-US" dirty="0" smtClean="0"/>
+              <a:t>Instructions</a:t>
+            </a:r>
+          </a:p>
+          <a:p>
+            <a:pPr lvl="2"/>
+            <a:r>
+              <a:rPr lang="en-US" dirty="0" smtClean="0"/>
+              <a:t>3.4 – Issue Machine Instructions			3.6 – Monitor Temperature</a:t>
+            </a:r>
+          </a:p>
+          <a:p>
+            <a:pPr lvl="2"/>
+            <a:r>
+              <a:rPr lang="en-US" dirty="0" smtClean="0"/>
+              <a:t>3.7 – Monitor Position				3.8 – Identify Material Constraints</a:t>
+            </a:r>
+          </a:p>
+          <a:p>
+            <a:pPr lvl="2"/>
+            <a:r>
+              <a:rPr lang="en-US" dirty="0" smtClean="0"/>
+              <a:t>3.9 – Identify Materials				3.10 – Identify Shapes</a:t>
+            </a:r>
+          </a:p>
+          <a:p>
+            <a:pPr lvl="2"/>
+            <a:r>
+              <a:rPr lang="en-US" dirty="0" smtClean="0"/>
+              <a:t>3.11 – Determine Shape of Support Material Structure	3.12 – Create Printing Path</a:t>
+            </a:r>
+          </a:p>
+          <a:p>
+            <a:pPr lvl="2"/>
+            <a:r>
+              <a:rPr lang="en-US" dirty="0" smtClean="0"/>
+              <a:t>3.14 – Store and Load Material Records			3.15 – Slice Geometry into Thickness Levels</a:t>
+            </a:r>
+          </a:p>
+          <a:p>
+            <a:pPr lvl="2"/>
+            <a:r>
+              <a:rPr lang="en-US" dirty="0" smtClean="0"/>
+              <a:t>3.16 – Monitor Flow Sensors 				4.2 – Host Software to Printer Connection</a:t>
+            </a:r>
+          </a:p>
+          <a:p>
+            <a:pPr lvl="1"/>
+            <a:r>
+              <a:rPr lang="en-US" b="1" dirty="0" smtClean="0"/>
+              <a:t>9.3.2</a:t>
+            </a:r>
+            <a:r>
+              <a:rPr lang="en-US" b="1" dirty="0"/>
+              <a:t>	Verification Procedure:</a:t>
+            </a:r>
+            <a:r>
+              <a:rPr lang="en-US" dirty="0"/>
+              <a:t>  The user will load an STL file and click print.  The system will </a:t>
+            </a:r>
+            <a:r>
+              <a:rPr lang="en-US" dirty="0" smtClean="0"/>
+              <a:t>				             then </a:t>
+            </a:r>
+            <a:r>
+              <a:rPr lang="en-US" dirty="0"/>
+              <a:t>print the correct shape and material.</a:t>
+            </a:r>
+          </a:p>
+          <a:p>
+            <a:r>
+              <a:rPr lang="en-US" b="1" dirty="0"/>
+              <a:t>9.4	Verify the system stops printing of out of operational range</a:t>
+            </a:r>
+          </a:p>
+          <a:p>
+            <a:pPr lvl="1"/>
+            <a:r>
+              <a:rPr lang="en-US" b="1" dirty="0" smtClean="0"/>
+              <a:t>9.4.1</a:t>
+            </a:r>
+            <a:r>
+              <a:rPr lang="en-US" b="1" dirty="0"/>
+              <a:t>	Requirement(s) addressed:</a:t>
+            </a:r>
+            <a:r>
+              <a:rPr lang="en-US" dirty="0"/>
+              <a:t>  </a:t>
+            </a:r>
+            <a:endParaRPr lang="en-US" dirty="0" smtClean="0"/>
+          </a:p>
+          <a:p>
+            <a:pPr lvl="2"/>
+            <a:r>
+              <a:rPr lang="en-US" dirty="0" smtClean="0"/>
+              <a:t>6.1 </a:t>
+            </a:r>
+            <a:r>
+              <a:rPr lang="en-US" dirty="0"/>
+              <a:t>– Temperature cutoff </a:t>
+            </a:r>
+            <a:r>
+              <a:rPr lang="en-US" dirty="0" smtClean="0"/>
+              <a:t>threshold			 </a:t>
+            </a:r>
+            <a:r>
+              <a:rPr lang="en-US" dirty="0"/>
+              <a:t>3.16 – Monitor Flow Sensors</a:t>
+            </a:r>
+          </a:p>
+          <a:p>
+            <a:pPr lvl="1"/>
+            <a:r>
+              <a:rPr lang="en-US" b="1" dirty="0" smtClean="0"/>
+              <a:t>9.4.2</a:t>
+            </a:r>
+            <a:r>
+              <a:rPr lang="en-US" b="1" dirty="0"/>
+              <a:t>	Verification Procedure:</a:t>
+            </a:r>
+            <a:r>
+              <a:rPr lang="en-US" dirty="0"/>
+              <a:t>  During a print run a fan will be pointed at the head reducing its </a:t>
+            </a:r>
+            <a:r>
+              <a:rPr lang="en-US" dirty="0" smtClean="0"/>
+              <a:t>				           temperature </a:t>
+            </a:r>
+            <a:r>
+              <a:rPr lang="en-US" dirty="0"/>
+              <a:t>to below specified material requirements and the </a:t>
+            </a:r>
+            <a:r>
+              <a:rPr lang="en-US" dirty="0" smtClean="0"/>
+              <a:t>				           printer </a:t>
+            </a:r>
+            <a:r>
+              <a:rPr lang="en-US" dirty="0"/>
+              <a:t>will stop printing until the temperature is raised to the </a:t>
+            </a:r>
+            <a:r>
+              <a:rPr lang="en-US" dirty="0" smtClean="0"/>
+              <a:t>				           correct </a:t>
+            </a:r>
+            <a:r>
+              <a:rPr lang="en-US" dirty="0"/>
+              <a:t>level.</a:t>
+            </a:r>
+          </a:p>
+          <a:p>
+            <a:pPr lvl="1"/>
+            <a:endParaRPr lang="en-US" dirty="0"/>
+          </a:p>
+        </p:txBody>
+      </p:sp>
+    </p:spTree>
+    <p:extLst>
+      <p:ext uri="{BB962C8B-B14F-4D97-AF65-F5344CB8AC3E}">
+        <p14:creationId xmlns:p14="http://schemas.microsoft.com/office/powerpoint/2010/main" val="4246882689"/>
+      </p:ext>
+    </p:extLst>
+  </p:cSld>
+  <p:clrMapOvr>
+    <a:masterClrMapping/>
+  </p:clrMapOvr>
+</p:sld>
+</file>
+
+<file path=ppt/slides/slide26.xml><?xml version="1.0" encoding="utf-8"?>
 <p:sld xmlns:a="http://schemas.openxmlformats.org/drawingml/2006/main" xmlns:r="http://schemas.openxmlformats.org/officeDocument/2006/relationships" xmlns:p="http://schemas.openxmlformats.org/presentationml/2006/main">
   <p:cSld>
     <p:spTree>
@@ -6385,7 +7732,7 @@
 </p:sld>
 </file>
 
-<file path=ppt/slides/slide22.xml><?xml version="1.0" encoding="utf-8"?>
+<file path=ppt/slides/slide27.xml><?xml version="1.0" encoding="utf-8"?>
 <p:sld xmlns:a="http://schemas.openxmlformats.org/drawingml/2006/main" xmlns:r="http://schemas.openxmlformats.org/officeDocument/2006/relationships" xmlns:p="http://schemas.openxmlformats.org/presentationml/2006/main">
   <p:cSld>
     <p:spTree>

</xml_diff>

<commit_message>
SRS Presentation - Changes the Risk/Deficiencies slide for feasibility
</commit_message>
<xml_diff>
--- a/SRS Presentation/SRS Presentation.pptx
+++ b/SRS Presentation/SRS Presentation.pptx
@@ -140,7 +140,7 @@
   </p:defaultTextStyle>
   <p:extLst>
     <p:ext uri="{EFAFB233-063F-42B5-8137-9DF3F51BA10A}">
-      <p15:sldGuideLst xmlns="" xmlns:p15="http://schemas.microsoft.com/office/powerpoint/2012/main">
+      <p15:sldGuideLst xmlns:p15="http://schemas.microsoft.com/office/powerpoint/2012/main" xmlns="">
         <p15:guide id="1" orient="horz" pos="2160">
           <p15:clr>
             <a:srgbClr val="A4A3A4"/>
@@ -351,7 +351,7 @@
           <a:p>
             <a:fld id="{EDF9711D-5344-4CF0-9364-A856E3E4122E}" type="datetimeFigureOut">
               <a:rPr lang="en-US" smtClean="0"/>
-              <a:t>11/3/2013</a:t>
+              <a:t>11/3/13</a:t>
             </a:fld>
             <a:endParaRPr lang="en-US"/>
           </a:p>
@@ -516,7 +516,7 @@
           <a:p>
             <a:fld id="{EDF9711D-5344-4CF0-9364-A856E3E4122E}" type="datetimeFigureOut">
               <a:rPr lang="en-US" smtClean="0"/>
-              <a:t>11/3/2013</a:t>
+              <a:t>11/3/13</a:t>
             </a:fld>
             <a:endParaRPr lang="en-US"/>
           </a:p>
@@ -691,7 +691,7 @@
           <a:p>
             <a:fld id="{EDF9711D-5344-4CF0-9364-A856E3E4122E}" type="datetimeFigureOut">
               <a:rPr lang="en-US" smtClean="0"/>
-              <a:t>11/3/2013</a:t>
+              <a:t>11/3/13</a:t>
             </a:fld>
             <a:endParaRPr lang="en-US"/>
           </a:p>
@@ -856,7 +856,7 @@
           <a:p>
             <a:fld id="{EDF9711D-5344-4CF0-9364-A856E3E4122E}" type="datetimeFigureOut">
               <a:rPr lang="en-US" smtClean="0"/>
-              <a:t>11/3/2013</a:t>
+              <a:t>11/3/13</a:t>
             </a:fld>
             <a:endParaRPr lang="en-US"/>
           </a:p>
@@ -1097,7 +1097,7 @@
           <a:p>
             <a:fld id="{EDF9711D-5344-4CF0-9364-A856E3E4122E}" type="datetimeFigureOut">
               <a:rPr lang="en-US" smtClean="0"/>
-              <a:t>11/3/2013</a:t>
+              <a:t>11/3/13</a:t>
             </a:fld>
             <a:endParaRPr lang="en-US"/>
           </a:p>
@@ -1380,7 +1380,7 @@
           <a:p>
             <a:fld id="{EDF9711D-5344-4CF0-9364-A856E3E4122E}" type="datetimeFigureOut">
               <a:rPr lang="en-US" smtClean="0"/>
-              <a:t>11/3/2013</a:t>
+              <a:t>11/3/13</a:t>
             </a:fld>
             <a:endParaRPr lang="en-US"/>
           </a:p>
@@ -1809,7 +1809,7 @@
           <a:p>
             <a:fld id="{EDF9711D-5344-4CF0-9364-A856E3E4122E}" type="datetimeFigureOut">
               <a:rPr lang="en-US" smtClean="0"/>
-              <a:t>11/3/2013</a:t>
+              <a:t>11/3/13</a:t>
             </a:fld>
             <a:endParaRPr lang="en-US"/>
           </a:p>
@@ -1922,7 +1922,7 @@
           <a:p>
             <a:fld id="{EDF9711D-5344-4CF0-9364-A856E3E4122E}" type="datetimeFigureOut">
               <a:rPr lang="en-US" smtClean="0"/>
-              <a:t>11/3/2013</a:t>
+              <a:t>11/3/13</a:t>
             </a:fld>
             <a:endParaRPr lang="en-US"/>
           </a:p>
@@ -2012,7 +2012,7 @@
           <a:p>
             <a:fld id="{EDF9711D-5344-4CF0-9364-A856E3E4122E}" type="datetimeFigureOut">
               <a:rPr lang="en-US" smtClean="0"/>
-              <a:t>11/3/2013</a:t>
+              <a:t>11/3/13</a:t>
             </a:fld>
             <a:endParaRPr lang="en-US"/>
           </a:p>
@@ -2201,7 +2201,7 @@
           <a:p>
             <a:fld id="{EDF9711D-5344-4CF0-9364-A856E3E4122E}" type="datetimeFigureOut">
               <a:rPr lang="en-US" smtClean="0"/>
-              <a:t>11/3/2013</a:t>
+              <a:t>11/3/13</a:t>
             </a:fld>
             <a:endParaRPr lang="en-US"/>
           </a:p>
@@ -2519,7 +2519,7 @@
           <a:p>
             <a:fld id="{EDF9711D-5344-4CF0-9364-A856E3E4122E}" type="datetimeFigureOut">
               <a:rPr lang="en-US" smtClean="0"/>
-              <a:t>11/3/2013</a:t>
+              <a:t>11/3/13</a:t>
             </a:fld>
             <a:endParaRPr lang="en-US"/>
           </a:p>
@@ -2898,7 +2898,7 @@
           <a:p>
             <a:fld id="{EDF9711D-5344-4CF0-9364-A856E3E4122E}" type="datetimeFigureOut">
               <a:rPr lang="en-US" smtClean="0"/>
-              <a:t>11/3/2013</a:t>
+              <a:t>11/3/13</a:t>
             </a:fld>
             <a:endParaRPr lang="en-US"/>
           </a:p>
@@ -3324,7 +3324,7 @@
   <p:timing>
     <p:tnLst>
       <p:par>
-        <p:cTn id="1" dur="indefinite" restart="never" nodeType="tmRoot"/>
+        <p:cTn xmlns:p14="http://schemas.microsoft.com/office/powerpoint/2010/main" id="1" dur="indefinite" restart="never" nodeType="tmRoot"/>
       </p:par>
     </p:tnLst>
   </p:timing>
@@ -3447,7 +3447,7 @@
   <p:timing>
     <p:tnLst>
       <p:par>
-        <p:cTn id="1" dur="indefinite" restart="never" nodeType="tmRoot"/>
+        <p:cTn xmlns:p14="http://schemas.microsoft.com/office/powerpoint/2010/main" id="1" dur="indefinite" restart="never" nodeType="tmRoot"/>
       </p:par>
     </p:tnLst>
   </p:timing>
@@ -3736,7 +3736,7 @@
   <p:timing>
     <p:tnLst>
       <p:par>
-        <p:cTn id="1" dur="indefinite" restart="never" nodeType="tmRoot"/>
+        <p:cTn xmlns:p14="http://schemas.microsoft.com/office/powerpoint/2010/main" id="1" dur="indefinite" restart="never" nodeType="tmRoot"/>
       </p:par>
     </p:tnLst>
   </p:timing>
@@ -4022,7 +4022,7 @@
   <p:timing>
     <p:tnLst>
       <p:par>
-        <p:cTn id="1" dur="indefinite" restart="never" nodeType="tmRoot"/>
+        <p:cTn xmlns:p14="http://schemas.microsoft.com/office/powerpoint/2010/main" id="1" dur="indefinite" restart="never" nodeType="tmRoot"/>
       </p:par>
     </p:tnLst>
   </p:timing>
@@ -4103,14 +4103,14 @@
             <a:noFill/>
           </a:ln>
           <a:extLst>
-            <a:ext uri="{909E8E84-426E-40DD-AFC4-6F175D3DCCD1}">
+            <a:ext uri="{909E8E84-426E-40dd-AFC4-6F175D3DCCD1}">
               <a14:hiddenFill xmlns:a14="http://schemas.microsoft.com/office/drawing/2010/main">
                 <a:solidFill>
                   <a:srgbClr val="FFFFFF"/>
                 </a:solidFill>
               </a14:hiddenFill>
             </a:ext>
-            <a:ext uri="{91240B29-F687-4F45-9708-019B960494DF}">
+            <a:ext uri="{91240B29-F687-4f45-9708-019B960494DF}">
               <a14:hiddenLine xmlns:a14="http://schemas.microsoft.com/office/drawing/2010/main" w="9525">
                 <a:solidFill>
                   <a:srgbClr val="000000"/>
@@ -4157,14 +4157,14 @@
             <a:noFill/>
           </a:ln>
           <a:extLst>
-            <a:ext uri="{909E8E84-426E-40DD-AFC4-6F175D3DCCD1}">
+            <a:ext uri="{909E8E84-426E-40dd-AFC4-6F175D3DCCD1}">
               <a14:hiddenFill xmlns:a14="http://schemas.microsoft.com/office/drawing/2010/main">
                 <a:solidFill>
                   <a:srgbClr val="FFFFFF"/>
                 </a:solidFill>
               </a14:hiddenFill>
             </a:ext>
-            <a:ext uri="{91240B29-F687-4F45-9708-019B960494DF}">
+            <a:ext uri="{91240B29-F687-4f45-9708-019B960494DF}">
               <a14:hiddenLine xmlns:a14="http://schemas.microsoft.com/office/drawing/2010/main" w="9525">
                 <a:solidFill>
                   <a:srgbClr val="000000"/>
@@ -4190,7 +4190,7 @@
   <p:timing>
     <p:tnLst>
       <p:par>
-        <p:cTn id="1" dur="indefinite" restart="never" nodeType="tmRoot"/>
+        <p:cTn xmlns:p14="http://schemas.microsoft.com/office/powerpoint/2010/main" id="1" dur="indefinite" restart="never" nodeType="tmRoot"/>
       </p:par>
     </p:tnLst>
   </p:timing>
@@ -4591,7 +4591,7 @@
   <p:timing>
     <p:tnLst>
       <p:par>
-        <p:cTn id="1" dur="indefinite" restart="never" nodeType="tmRoot"/>
+        <p:cTn xmlns:p14="http://schemas.microsoft.com/office/powerpoint/2010/main" id="1" dur="indefinite" restart="never" nodeType="tmRoot"/>
       </p:par>
     </p:tnLst>
   </p:timing>
@@ -4863,7 +4863,7 @@
   <p:timing>
     <p:tnLst>
       <p:par>
-        <p:cTn id="1" dur="indefinite" restart="never" nodeType="tmRoot"/>
+        <p:cTn xmlns:p14="http://schemas.microsoft.com/office/powerpoint/2010/main" id="1" dur="indefinite" restart="never" nodeType="tmRoot"/>
       </p:par>
     </p:tnLst>
   </p:timing>
@@ -5054,7 +5054,7 @@
   <p:timing>
     <p:tnLst>
       <p:par>
-        <p:cTn id="1" dur="indefinite" restart="never" nodeType="tmRoot"/>
+        <p:cTn xmlns:p14="http://schemas.microsoft.com/office/powerpoint/2010/main" id="1" dur="indefinite" restart="never" nodeType="tmRoot"/>
       </p:par>
     </p:tnLst>
   </p:timing>
@@ -5302,7 +5302,7 @@
   <p:timing>
     <p:tnLst>
       <p:par>
-        <p:cTn id="1" dur="indefinite" restart="never" nodeType="tmRoot"/>
+        <p:cTn xmlns:p14="http://schemas.microsoft.com/office/powerpoint/2010/main" id="1" dur="indefinite" restart="never" nodeType="tmRoot"/>
       </p:par>
     </p:tnLst>
   </p:timing>
@@ -5582,7 +5582,7 @@
   <p:timing>
     <p:tnLst>
       <p:par>
-        <p:cTn id="1" dur="indefinite" restart="never" nodeType="tmRoot"/>
+        <p:cTn xmlns:p14="http://schemas.microsoft.com/office/powerpoint/2010/main" id="1" dur="indefinite" restart="never" nodeType="tmRoot"/>
       </p:par>
     </p:tnLst>
   </p:timing>
@@ -5781,7 +5781,7 @@
   <p:timing>
     <p:tnLst>
       <p:par>
-        <p:cTn id="1" dur="indefinite" restart="never" nodeType="tmRoot"/>
+        <p:cTn xmlns:p14="http://schemas.microsoft.com/office/powerpoint/2010/main" id="1" dur="indefinite" restart="never" nodeType="tmRoot"/>
       </p:par>
     </p:tnLst>
   </p:timing>
@@ -5895,7 +5895,6 @@
               <a:rPr lang="en-US" dirty="0" smtClean="0"/>
               <a:t>Feasibility Analysis</a:t>
             </a:r>
-            <a:endParaRPr lang="en-US" dirty="0" smtClean="0"/>
           </a:p>
           <a:p>
             <a:endParaRPr lang="en-US" dirty="0" smtClean="0"/>
@@ -5918,7 +5917,7 @@
   <p:timing>
     <p:tnLst>
       <p:par>
-        <p:cTn id="1" dur="indefinite" restart="never" nodeType="tmRoot"/>
+        <p:cTn xmlns:p14="http://schemas.microsoft.com/office/powerpoint/2010/main" id="1" dur="indefinite" restart="never" nodeType="tmRoot"/>
       </p:par>
     </p:tnLst>
   </p:timing>
@@ -6248,7 +6247,7 @@
   <p:timing>
     <p:tnLst>
       <p:par>
-        <p:cTn id="1" dur="indefinite" restart="never" nodeType="tmRoot"/>
+        <p:cTn xmlns:p14="http://schemas.microsoft.com/office/powerpoint/2010/main" id="1" dur="indefinite" restart="never" nodeType="tmRoot"/>
       </p:par>
     </p:tnLst>
   </p:timing>
@@ -6586,7 +6585,7 @@
   <p:timing>
     <p:tnLst>
       <p:par>
-        <p:cTn id="1" dur="indefinite" restart="never" nodeType="tmRoot"/>
+        <p:cTn xmlns:p14="http://schemas.microsoft.com/office/powerpoint/2010/main" id="1" dur="indefinite" restart="never" nodeType="tmRoot"/>
       </p:par>
     </p:tnLst>
   </p:timing>
@@ -6787,7 +6786,7 @@
   <p:timing>
     <p:tnLst>
       <p:par>
-        <p:cTn id="1" dur="indefinite" restart="never" nodeType="tmRoot"/>
+        <p:cTn xmlns:p14="http://schemas.microsoft.com/office/powerpoint/2010/main" id="1" dur="indefinite" restart="never" nodeType="tmRoot"/>
       </p:par>
     </p:tnLst>
   </p:timing>
@@ -7089,7 +7088,7 @@
   <p:timing>
     <p:tnLst>
       <p:par>
-        <p:cTn id="1" dur="indefinite" restart="never" nodeType="tmRoot"/>
+        <p:cTn xmlns:p14="http://schemas.microsoft.com/office/powerpoint/2010/main" id="1" dur="indefinite" restart="never" nodeType="tmRoot"/>
       </p:par>
     </p:tnLst>
   </p:timing>
@@ -7294,7 +7293,7 @@
   <p:timing>
     <p:tnLst>
       <p:par>
-        <p:cTn id="1" dur="indefinite" restart="never" nodeType="tmRoot"/>
+        <p:cTn xmlns:p14="http://schemas.microsoft.com/office/powerpoint/2010/main" id="1" dur="indefinite" restart="never" nodeType="tmRoot"/>
       </p:par>
     </p:tnLst>
   </p:timing>
@@ -7567,7 +7566,7 @@
   <p:timing>
     <p:tnLst>
       <p:par>
-        <p:cTn id="1" dur="indefinite" restart="never" nodeType="tmRoot"/>
+        <p:cTn xmlns:p14="http://schemas.microsoft.com/office/powerpoint/2010/main" id="1" dur="indefinite" restart="never" nodeType="tmRoot"/>
       </p:par>
     </p:tnLst>
   </p:timing>
@@ -7849,7 +7848,7 @@
   <p:timing>
     <p:tnLst>
       <p:par>
-        <p:cTn id="1" dur="indefinite" restart="never" nodeType="tmRoot"/>
+        <p:cTn xmlns:p14="http://schemas.microsoft.com/office/powerpoint/2010/main" id="1" dur="indefinite" restart="never" nodeType="tmRoot"/>
       </p:par>
     </p:tnLst>
   </p:timing>
@@ -7930,14 +7929,14 @@
             <a:noFill/>
           </a:ln>
           <a:extLst>
-            <a:ext uri="{909E8E84-426E-40DD-AFC4-6F175D3DCCD1}">
+            <a:ext uri="{909E8E84-426E-40dd-AFC4-6F175D3DCCD1}">
               <a14:hiddenFill xmlns:a14="http://schemas.microsoft.com/office/drawing/2010/main">
                 <a:solidFill>
                   <a:srgbClr val="FFFFFF"/>
                 </a:solidFill>
               </a14:hiddenFill>
             </a:ext>
-            <a:ext uri="{91240B29-F687-4F45-9708-019B960494DF}">
+            <a:ext uri="{91240B29-F687-4f45-9708-019B960494DF}">
               <a14:hiddenLine xmlns:a14="http://schemas.microsoft.com/office/drawing/2010/main" w="9525">
                 <a:solidFill>
                   <a:srgbClr val="000000"/>
@@ -7963,7 +7962,7 @@
   <p:timing>
     <p:tnLst>
       <p:par>
-        <p:cTn id="1" dur="indefinite" restart="never" nodeType="tmRoot"/>
+        <p:cTn xmlns:p14="http://schemas.microsoft.com/office/powerpoint/2010/main" id="1" dur="indefinite" restart="never" nodeType="tmRoot"/>
       </p:par>
     </p:tnLst>
   </p:timing>
@@ -8276,7 +8275,7 @@
   <p:timing>
     <p:tnLst>
       <p:par>
-        <p:cTn id="1" dur="indefinite" restart="never" nodeType="tmRoot"/>
+        <p:cTn xmlns:p14="http://schemas.microsoft.com/office/powerpoint/2010/main" id="1" dur="indefinite" restart="never" nodeType="tmRoot"/>
       </p:par>
     </p:tnLst>
   </p:timing>
@@ -8431,7 +8430,7 @@
   <p:timing>
     <p:tnLst>
       <p:par>
-        <p:cTn id="1" dur="indefinite" restart="never" nodeType="tmRoot"/>
+        <p:cTn xmlns:p14="http://schemas.microsoft.com/office/powerpoint/2010/main" id="1" dur="indefinite" restart="never" nodeType="tmRoot"/>
       </p:par>
     </p:tnLst>
   </p:timing>
@@ -8587,7 +8586,7 @@
   <p:timing>
     <p:tnLst>
       <p:par>
-        <p:cTn id="1" dur="indefinite" restart="never" nodeType="tmRoot"/>
+        <p:cTn xmlns:p14="http://schemas.microsoft.com/office/powerpoint/2010/main" id="1" dur="indefinite" restart="never" nodeType="tmRoot"/>
       </p:par>
     </p:tnLst>
   </p:timing>
@@ -8647,12 +8646,25 @@
         <p:spPr/>
         <p:txBody>
           <a:bodyPr>
-            <a:normAutofit lnSpcReduction="10000"/>
+            <a:normAutofit fontScale="77500" lnSpcReduction="20000"/>
           </a:bodyPr>
           <a:lstStyle/>
           <a:p>
             <a:r>
               <a:rPr lang="en-US" sz="3600" dirty="0" smtClean="0"/>
+              <a:t>STL format not sufficient for describing multiple materials</a:t>
+            </a:r>
+          </a:p>
+          <a:p>
+            <a:pPr lvl="1"/>
+            <a:r>
+              <a:rPr lang="en-US" sz="3200" dirty="0" smtClean="0"/>
+              <a:t>Resolution:  Simple conversion to another format (AMF)</a:t>
+            </a:r>
+          </a:p>
+          <a:p>
+            <a:r>
+              <a:rPr lang="en-US" sz="3600" dirty="0" smtClean="0"/>
               <a:t>Slic3r </a:t>
             </a:r>
             <a:r>
@@ -8667,8 +8679,12 @@
           <a:p>
             <a:pPr lvl="1"/>
             <a:r>
+              <a:rPr lang="en-US" sz="3400" dirty="0" smtClean="0"/>
+              <a:t>Deficiency:  Analytic </a:t>
+            </a:r>
+            <a:r>
               <a:rPr lang="en-US" sz="3400" dirty="0"/>
-              <a:t>Analytic Geometry skills not </a:t>
+              <a:t>Geometry skills not </a:t>
             </a:r>
             <a:r>
               <a:rPr lang="en-US" sz="3400" dirty="0" smtClean="0"/>
@@ -8679,31 +8695,46 @@
             <a:pPr lvl="1"/>
             <a:r>
               <a:rPr lang="en-US" sz="3400" dirty="0" smtClean="0"/>
-              <a:t>Research and Experimentation</a:t>
-            </a:r>
+              <a:t>Resolution:  Research </a:t>
+            </a:r>
+            <a:r>
+              <a:rPr lang="en-US" sz="3400" dirty="0" smtClean="0"/>
+              <a:t>and </a:t>
+            </a:r>
+            <a:r>
+              <a:rPr lang="en-US" sz="3400" dirty="0" smtClean="0"/>
+              <a:t>Experimentation</a:t>
+            </a:r>
+            <a:endParaRPr lang="en-US" sz="3400" dirty="0" smtClean="0"/>
           </a:p>
           <a:p>
             <a:r>
               <a:rPr lang="en-US" sz="3600" dirty="0"/>
-              <a:t>Hardware selection is not specified </a:t>
-            </a:r>
-            <a:r>
-              <a:rPr lang="en-US" sz="3600" dirty="0" smtClean="0"/>
-              <a:t>correctly</a:t>
-            </a:r>
+              <a:t>Hardware </a:t>
+            </a:r>
+            <a:r>
+              <a:rPr lang="en-US" sz="3600" smtClean="0"/>
+              <a:t>implementation problems</a:t>
+            </a:r>
+            <a:endParaRPr lang="en-US" sz="3600" dirty="0" smtClean="0"/>
           </a:p>
           <a:p>
             <a:pPr lvl="1"/>
             <a:r>
               <a:rPr lang="en-US" sz="3400" dirty="0" smtClean="0"/>
-              <a:t>Computer engineer required to assist ME team</a:t>
-            </a:r>
+              <a:t>Deficiency:  Only one computer engineer with sufficient hardware knowledge/experience</a:t>
+            </a:r>
+            <a:endParaRPr lang="en-US" sz="3400" dirty="0" smtClean="0"/>
           </a:p>
           <a:p>
             <a:pPr lvl="1"/>
             <a:r>
               <a:rPr lang="en-US" sz="3400" dirty="0" smtClean="0"/>
-              <a:t>Scope Definition</a:t>
+              <a:t>Resolution:  Scope </a:t>
+            </a:r>
+            <a:r>
+              <a:rPr lang="en-US" sz="3400" dirty="0" smtClean="0"/>
+              <a:t>Definition</a:t>
             </a:r>
           </a:p>
           <a:p>
@@ -8716,7 +8747,11 @@
             <a:pPr lvl="1"/>
             <a:r>
               <a:rPr lang="en-US" sz="3400" dirty="0" smtClean="0"/>
-              <a:t>Research and Demonstrations</a:t>
+              <a:t>Resolution:  Research </a:t>
+            </a:r>
+            <a:r>
+              <a:rPr lang="en-US" sz="3400" dirty="0" smtClean="0"/>
+              <a:t>and Demonstrations</a:t>
             </a:r>
             <a:endParaRPr lang="en-US" sz="3400" dirty="0"/>
           </a:p>
@@ -8735,7 +8770,7 @@
   <p:timing>
     <p:tnLst>
       <p:par>
-        <p:cTn id="1" dur="indefinite" restart="never" nodeType="tmRoot"/>
+        <p:cTn xmlns:p14="http://schemas.microsoft.com/office/powerpoint/2010/main" id="1" dur="indefinite" restart="never" nodeType="tmRoot"/>
       </p:par>
     </p:tnLst>
   </p:timing>
@@ -10168,7 +10203,7 @@
   <p:timing>
     <p:tnLst>
       <p:par>
-        <p:cTn id="1" dur="indefinite" restart="never" nodeType="tmRoot"/>
+        <p:cTn xmlns:p14="http://schemas.microsoft.com/office/powerpoint/2010/main" id="1" dur="indefinite" restart="never" nodeType="tmRoot"/>
       </p:par>
     </p:tnLst>
   </p:timing>
@@ -10231,7 +10266,7 @@
         </p:nvGraphicFramePr>
         <p:xfrm>
           <a:off x="849089" y="1135581"/>
-          <a:ext cx="8763002" cy="5641570"/>
+          <a:ext cx="8763002" cy="5999604"/>
         </p:xfrm>
         <a:graphic>
           <a:graphicData uri="http://schemas.openxmlformats.org/drawingml/2006/table">
@@ -12994,7 +13029,7 @@
   <p:timing>
     <p:tnLst>
       <p:par>
-        <p:cTn id="1" dur="indefinite" restart="never" nodeType="tmRoot"/>
+        <p:cTn xmlns:p14="http://schemas.microsoft.com/office/powerpoint/2010/main" id="1" dur="indefinite" restart="never" nodeType="tmRoot"/>
       </p:par>
     </p:tnLst>
   </p:timing>
@@ -14283,7 +14318,7 @@
   <p:timing>
     <p:tnLst>
       <p:par>
-        <p:cTn id="1" dur="indefinite" restart="never" nodeType="tmRoot"/>
+        <p:cTn xmlns:p14="http://schemas.microsoft.com/office/powerpoint/2010/main" id="1" dur="indefinite" restart="never" nodeType="tmRoot"/>
       </p:par>
     </p:tnLst>
   </p:timing>
@@ -15813,7 +15848,7 @@
   <p:timing>
     <p:tnLst>
       <p:par>
-        <p:cTn id="1" dur="indefinite" restart="never" nodeType="tmRoot"/>
+        <p:cTn xmlns:p14="http://schemas.microsoft.com/office/powerpoint/2010/main" id="1" dur="indefinite" restart="never" nodeType="tmRoot"/>
       </p:par>
     </p:tnLst>
   </p:timing>
@@ -15909,7 +15944,7 @@
   <p:timing>
     <p:tnLst>
       <p:par>
-        <p:cTn id="1" dur="indefinite" restart="never" nodeType="tmRoot"/>
+        <p:cTn xmlns:p14="http://schemas.microsoft.com/office/powerpoint/2010/main" id="1" dur="indefinite" restart="never" nodeType="tmRoot"/>
       </p:par>
     </p:tnLst>
   </p:timing>
@@ -15990,14 +16025,14 @@
             <a:noFill/>
           </a:ln>
           <a:extLst>
-            <a:ext uri="{909E8E84-426E-40DD-AFC4-6F175D3DCCD1}">
+            <a:ext uri="{909E8E84-426E-40dd-AFC4-6F175D3DCCD1}">
               <a14:hiddenFill xmlns:a14="http://schemas.microsoft.com/office/drawing/2010/main">
                 <a:solidFill>
                   <a:srgbClr val="FFFFFF"/>
                 </a:solidFill>
               </a14:hiddenFill>
             </a:ext>
-            <a:ext uri="{91240B29-F687-4F45-9708-019B960494DF}">
+            <a:ext uri="{91240B29-F687-4f45-9708-019B960494DF}">
               <a14:hiddenLine xmlns:a14="http://schemas.microsoft.com/office/drawing/2010/main" w="9525">
                 <a:solidFill>
                   <a:srgbClr val="000000"/>
@@ -16023,7 +16058,7 @@
   <p:timing>
     <p:tnLst>
       <p:par>
-        <p:cTn id="1" dur="indefinite" restart="never" nodeType="tmRoot"/>
+        <p:cTn xmlns:p14="http://schemas.microsoft.com/office/powerpoint/2010/main" id="1" dur="indefinite" restart="never" nodeType="tmRoot"/>
       </p:par>
     </p:tnLst>
   </p:timing>
@@ -16339,7 +16374,7 @@
   <p:timing>
     <p:tnLst>
       <p:par>
-        <p:cTn id="1" dur="indefinite" restart="never" nodeType="tmRoot"/>
+        <p:cTn xmlns:p14="http://schemas.microsoft.com/office/powerpoint/2010/main" id="1" dur="indefinite" restart="never" nodeType="tmRoot"/>
       </p:par>
     </p:tnLst>
   </p:timing>
@@ -16687,7 +16722,7 @@
   <p:timing>
     <p:tnLst>
       <p:par>
-        <p:cTn id="1" dur="indefinite" restart="never" nodeType="tmRoot"/>
+        <p:cTn xmlns:p14="http://schemas.microsoft.com/office/powerpoint/2010/main" id="1" dur="indefinite" restart="never" nodeType="tmRoot"/>
       </p:par>
     </p:tnLst>
   </p:timing>
@@ -16978,7 +17013,7 @@
   <p:timing>
     <p:tnLst>
       <p:par>
-        <p:cTn id="1" dur="indefinite" restart="never" nodeType="tmRoot"/>
+        <p:cTn xmlns:p14="http://schemas.microsoft.com/office/powerpoint/2010/main" id="1" dur="indefinite" restart="never" nodeType="tmRoot"/>
       </p:par>
     </p:tnLst>
   </p:timing>
@@ -17285,7 +17320,7 @@
   <p:timing>
     <p:tnLst>
       <p:par>
-        <p:cTn id="1" dur="indefinite" restart="never" nodeType="tmRoot"/>
+        <p:cTn xmlns:p14="http://schemas.microsoft.com/office/powerpoint/2010/main" id="1" dur="indefinite" restart="never" nodeType="tmRoot"/>
       </p:par>
     </p:tnLst>
   </p:timing>
@@ -17597,7 +17632,7 @@
   <p:timing>
     <p:tnLst>
       <p:par>
-        <p:cTn id="1" dur="indefinite" restart="never" nodeType="tmRoot"/>
+        <p:cTn xmlns:p14="http://schemas.microsoft.com/office/powerpoint/2010/main" id="1" dur="indefinite" restart="never" nodeType="tmRoot"/>
       </p:par>
     </p:tnLst>
   </p:timing>

</xml_diff>

<commit_message>
SRS Presentation - Fixed a table that was going off the screen
</commit_message>
<xml_diff>
--- a/SRS Presentation/SRS Presentation.pptx
+++ b/SRS Presentation/SRS Presentation.pptx
@@ -140,7 +140,7 @@
   </p:defaultTextStyle>
   <p:extLst>
     <p:ext uri="{EFAFB233-063F-42B5-8137-9DF3F51BA10A}">
-      <p15:sldGuideLst xmlns:p15="http://schemas.microsoft.com/office/powerpoint/2012/main" xmlns="">
+      <p15:sldGuideLst xmlns="" xmlns:p15="http://schemas.microsoft.com/office/powerpoint/2012/main">
         <p15:guide id="1" orient="horz" pos="2160">
           <p15:clr>
             <a:srgbClr val="A4A3A4"/>
@@ -8695,17 +8695,8 @@
             <a:pPr lvl="1"/>
             <a:r>
               <a:rPr lang="en-US" sz="3400" dirty="0" smtClean="0"/>
-              <a:t>Resolution:  Research </a:t>
-            </a:r>
-            <a:r>
-              <a:rPr lang="en-US" sz="3400" dirty="0" smtClean="0"/>
-              <a:t>and </a:t>
-            </a:r>
-            <a:r>
-              <a:rPr lang="en-US" sz="3400" dirty="0" smtClean="0"/>
-              <a:t>Experimentation</a:t>
-            </a:r>
-            <a:endParaRPr lang="en-US" sz="3400" dirty="0" smtClean="0"/>
+              <a:t>Resolution:  Research and Experimentation</a:t>
+            </a:r>
           </a:p>
           <a:p>
             <a:r>
@@ -8724,17 +8715,12 @@
               <a:rPr lang="en-US" sz="3400" dirty="0" smtClean="0"/>
               <a:t>Deficiency:  Only one computer engineer with sufficient hardware knowledge/experience</a:t>
             </a:r>
-            <a:endParaRPr lang="en-US" sz="3400" dirty="0" smtClean="0"/>
           </a:p>
           <a:p>
             <a:pPr lvl="1"/>
             <a:r>
               <a:rPr lang="en-US" sz="3400" dirty="0" smtClean="0"/>
-              <a:t>Resolution:  Scope </a:t>
-            </a:r>
-            <a:r>
-              <a:rPr lang="en-US" sz="3400" dirty="0" smtClean="0"/>
-              <a:t>Definition</a:t>
+              <a:t>Resolution:  Scope Definition</a:t>
             </a:r>
           </a:p>
           <a:p>
@@ -8747,11 +8733,7 @@
             <a:pPr lvl="1"/>
             <a:r>
               <a:rPr lang="en-US" sz="3400" dirty="0" smtClean="0"/>
-              <a:t>Resolution:  Research </a:t>
-            </a:r>
-            <a:r>
-              <a:rPr lang="en-US" sz="3400" dirty="0" smtClean="0"/>
-              <a:t>and Demonstrations</a:t>
+              <a:t>Resolution:  Research and Demonstrations</a:t>
             </a:r>
             <a:endParaRPr lang="en-US" sz="3400" dirty="0"/>
           </a:p>
@@ -10259,14 +10241,14 @@
           <p:nvPr>
             <p:extLst>
               <p:ext uri="{D42A27DB-BD31-4B8C-83A1-F6EECF244321}">
-                <p14:modId xmlns:p14="http://schemas.microsoft.com/office/powerpoint/2010/main" val="2522195874"/>
+                <p14:modId xmlns:p14="http://schemas.microsoft.com/office/powerpoint/2010/main" val="2899548131"/>
               </p:ext>
             </p:extLst>
           </p:nvPr>
         </p:nvGraphicFramePr>
         <p:xfrm>
           <a:off x="849089" y="1135581"/>
-          <a:ext cx="8763002" cy="5999604"/>
+          <a:ext cx="8763002" cy="5649084"/>
         </p:xfrm>
         <a:graphic>
           <a:graphicData uri="http://schemas.openxmlformats.org/drawingml/2006/table">
@@ -12622,27 +12604,11 @@
                   <a:tcPr marL="0" marR="0" marT="0" marB="0"/>
                 </a:tc>
               </a:tr>
-              <a:tr h="654930">
+              <a:tr h="297138">
                 <a:tc gridSpan="4">
                   <a:txBody>
                     <a:bodyPr/>
                     <a:lstStyle/>
-                    <a:p>
-                      <a:pPr marL="1967865" marR="1956435" algn="l">
-                        <a:lnSpc>
-                          <a:spcPct val="115000"/>
-                        </a:lnSpc>
-                        <a:spcBef>
-                          <a:spcPts val="0"/>
-                        </a:spcBef>
-                        <a:spcAft>
-                          <a:spcPts val="0"/>
-                        </a:spcAft>
-                      </a:pPr>
-                      <a:endParaRPr lang="en-US" sz="2000" dirty="0" smtClean="0">
-                        <a:effectLst/>
-                      </a:endParaRPr>
-                    </a:p>
                     <a:p>
                       <a:pPr marL="1967865" marR="1956435" algn="l">
                         <a:lnSpc>

</xml_diff>